<commit_message>
Changes on the final LCA report and presentation
</commit_message>
<xml_diff>
--- a/LCA/2nd-Progress-Presentation.pptx
+++ b/LCA/2nd-Progress-Presentation.pptx
@@ -21,7 +21,7 @@
     <p:sldId id="269" r:id="rId16"/>
     <p:sldId id="270" r:id="rId17"/>
   </p:sldIdLst>
-  <p:sldSz cx="12192000" cy="6858000"/>
+  <p:sldSz cx="12188825" cy="6858000"/>
   <p:notesSz cx="7559675" cy="10691813"/>
 </p:presentation>
 </file>
@@ -75,6 +75,7 @@
                 </a:pPr>
               </a:p>
             </c:txPr>
+            <c:dLblPos val="outEnd"/>
             <c:showLegendKey val="0"/>
             <c:showVal val="0"/>
             <c:showCatName val="0"/>
@@ -180,6 +181,7 @@
                 </a:pPr>
               </a:p>
             </c:txPr>
+            <c:dLblPos val="outEnd"/>
             <c:showLegendKey val="0"/>
             <c:showVal val="0"/>
             <c:showCatName val="0"/>
@@ -249,11 +251,11 @@
         </c:ser>
         <c:gapWidth val="100"/>
         <c:overlap val="0"/>
-        <c:axId val="20146652"/>
-        <c:axId val="62857993"/>
+        <c:axId val="63063814"/>
+        <c:axId val="3270684"/>
       </c:barChart>
       <c:catAx>
-        <c:axId val="20146652"/>
+        <c:axId val="63063814"/>
         <c:scaling>
           <c:orientation val="minMax"/>
         </c:scaling>
@@ -284,7 +286,7 @@
             </a:pPr>
           </a:p>
         </c:txPr>
-        <c:crossAx val="62857993"/>
+        <c:crossAx val="3270684"/>
         <c:crosses val="autoZero"/>
         <c:auto val="1"/>
         <c:lblAlgn val="ctr"/>
@@ -292,7 +294,7 @@
         <c:noMultiLvlLbl val="0"/>
       </c:catAx>
       <c:valAx>
-        <c:axId val="62857993"/>
+        <c:axId val="3270684"/>
         <c:scaling>
           <c:orientation val="minMax"/>
         </c:scaling>
@@ -332,7 +334,7 @@
             </a:pPr>
           </a:p>
         </c:txPr>
-        <c:crossAx val="20146652"/>
+        <c:crossAx val="63063814"/>
         <c:crosses val="autoZero"/>
         <c:crossBetween val="between"/>
       </c:valAx>
@@ -434,7 +436,7 @@
         <p:txBody>
           <a:bodyPr/>
           <a:p>
-            <a:fld id="{12C196E4-964E-4070-B43B-B002BF360904}" type="slidenum">
+            <a:fld id="{825B0ED1-965A-4DBB-9163-7D35F4019B94}" type="slidenum">
               <a:t>&lt;#&gt;</a:t>
             </a:fld>
           </a:p>
@@ -495,8 +497,8 @@
         </p:nvSpPr>
         <p:spPr>
           <a:xfrm>
-            <a:off x="609480" y="273600"/>
-            <a:ext cx="10972080" cy="1144440"/>
+            <a:off x="609120" y="273600"/>
+            <a:ext cx="10968840" cy="1144080"/>
           </a:xfrm>
           <a:prstGeom prst="rect">
             <a:avLst/>
@@ -535,8 +537,8 @@
         </p:nvSpPr>
         <p:spPr>
           <a:xfrm>
-            <a:off x="609480" y="1604520"/>
-            <a:ext cx="10972080" cy="1896840"/>
+            <a:off x="609120" y="1604520"/>
+            <a:ext cx="5352480" cy="904320"/>
           </a:xfrm>
           <a:prstGeom prst="rect">
             <a:avLst/>
@@ -578,8 +580,8 @@
         </p:nvSpPr>
         <p:spPr>
           <a:xfrm>
-            <a:off x="609480" y="3682080"/>
-            <a:ext cx="10972080" cy="1896840"/>
+            <a:off x="609120" y="2595240"/>
+            <a:ext cx="5352480" cy="904320"/>
           </a:xfrm>
           <a:prstGeom prst="rect">
             <a:avLst/>
@@ -643,7 +645,7 @@
         <p:txBody>
           <a:bodyPr/>
           <a:p>
-            <a:fld id="{0473BC24-CAEF-413F-872D-1C5EAFD4F6F0}" type="slidenum">
+            <a:fld id="{DED52075-FC86-41E0-8326-B218B69E2D27}" type="slidenum">
               <a:t>&lt;#&gt;</a:t>
             </a:fld>
           </a:p>
@@ -704,8 +706,8 @@
         </p:nvSpPr>
         <p:spPr>
           <a:xfrm>
-            <a:off x="609480" y="273600"/>
-            <a:ext cx="10972080" cy="1144440"/>
+            <a:off x="609120" y="273600"/>
+            <a:ext cx="10968840" cy="1144080"/>
           </a:xfrm>
           <a:prstGeom prst="rect">
             <a:avLst/>
@@ -744,8 +746,8 @@
         </p:nvSpPr>
         <p:spPr>
           <a:xfrm>
-            <a:off x="609480" y="1604520"/>
-            <a:ext cx="5354280" cy="1896840"/>
+            <a:off x="609120" y="1604520"/>
+            <a:ext cx="2611800" cy="904320"/>
           </a:xfrm>
           <a:prstGeom prst="rect">
             <a:avLst/>
@@ -787,8 +789,8 @@
         </p:nvSpPr>
         <p:spPr>
           <a:xfrm>
-            <a:off x="6231960" y="1604520"/>
-            <a:ext cx="5354280" cy="1896840"/>
+            <a:off x="3351960" y="1604520"/>
+            <a:ext cx="2611800" cy="904320"/>
           </a:xfrm>
           <a:prstGeom prst="rect">
             <a:avLst/>
@@ -830,8 +832,8 @@
         </p:nvSpPr>
         <p:spPr>
           <a:xfrm>
-            <a:off x="609480" y="3682080"/>
-            <a:ext cx="5354280" cy="1896840"/>
+            <a:off x="609120" y="2595240"/>
+            <a:ext cx="2611800" cy="904320"/>
           </a:xfrm>
           <a:prstGeom prst="rect">
             <a:avLst/>
@@ -873,8 +875,8 @@
         </p:nvSpPr>
         <p:spPr>
           <a:xfrm>
-            <a:off x="6231960" y="3682080"/>
-            <a:ext cx="5354280" cy="1896840"/>
+            <a:off x="3351960" y="2595240"/>
+            <a:ext cx="2611800" cy="904320"/>
           </a:xfrm>
           <a:prstGeom prst="rect">
             <a:avLst/>
@@ -938,7 +940,7 @@
         <p:txBody>
           <a:bodyPr/>
           <a:p>
-            <a:fld id="{D2638A6B-BC8E-46D9-A7D7-E746B71ED5DE}" type="slidenum">
+            <a:fld id="{01805AF2-387D-49C6-A500-3A07139F0938}" type="slidenum">
               <a:t>&lt;#&gt;</a:t>
             </a:fld>
           </a:p>
@@ -999,8 +1001,8 @@
         </p:nvSpPr>
         <p:spPr>
           <a:xfrm>
-            <a:off x="609480" y="273600"/>
-            <a:ext cx="10972080" cy="1144440"/>
+            <a:off x="609120" y="273600"/>
+            <a:ext cx="10968840" cy="1144080"/>
           </a:xfrm>
           <a:prstGeom prst="rect">
             <a:avLst/>
@@ -1039,8 +1041,8 @@
         </p:nvSpPr>
         <p:spPr>
           <a:xfrm>
-            <a:off x="609480" y="1604520"/>
-            <a:ext cx="3532680" cy="1896840"/>
+            <a:off x="609120" y="1604520"/>
+            <a:ext cx="1723320" cy="904320"/>
           </a:xfrm>
           <a:prstGeom prst="rect">
             <a:avLst/>
@@ -1052,7 +1054,7 @@
         </p:spPr>
         <p:txBody>
           <a:bodyPr lIns="0" rIns="0" tIns="0" bIns="0" anchor="t">
-            <a:normAutofit/>
+            <a:normAutofit fontScale="84366"/>
           </a:bodyPr>
           <a:p>
             <a:pPr indent="0">
@@ -1082,8 +1084,8 @@
         </p:nvSpPr>
         <p:spPr>
           <a:xfrm>
-            <a:off x="4319280" y="1604520"/>
-            <a:ext cx="3532680" cy="1896840"/>
+            <a:off x="2418840" y="1604520"/>
+            <a:ext cx="1723320" cy="904320"/>
           </a:xfrm>
           <a:prstGeom prst="rect">
             <a:avLst/>
@@ -1095,7 +1097,7 @@
         </p:spPr>
         <p:txBody>
           <a:bodyPr lIns="0" rIns="0" tIns="0" bIns="0" anchor="t">
-            <a:normAutofit/>
+            <a:normAutofit fontScale="84366"/>
           </a:bodyPr>
           <a:p>
             <a:pPr indent="0">
@@ -1125,8 +1127,8 @@
         </p:nvSpPr>
         <p:spPr>
           <a:xfrm>
-            <a:off x="8028720" y="1604520"/>
-            <a:ext cx="3532680" cy="1896840"/>
+            <a:off x="4228920" y="1604520"/>
+            <a:ext cx="1723320" cy="904320"/>
           </a:xfrm>
           <a:prstGeom prst="rect">
             <a:avLst/>
@@ -1138,7 +1140,7 @@
         </p:spPr>
         <p:txBody>
           <a:bodyPr lIns="0" rIns="0" tIns="0" bIns="0" anchor="t">
-            <a:normAutofit/>
+            <a:normAutofit fontScale="84366"/>
           </a:bodyPr>
           <a:p>
             <a:pPr indent="0">
@@ -1168,8 +1170,8 @@
         </p:nvSpPr>
         <p:spPr>
           <a:xfrm>
-            <a:off x="609480" y="3682080"/>
-            <a:ext cx="3532680" cy="1896840"/>
+            <a:off x="609120" y="2595240"/>
+            <a:ext cx="1723320" cy="904320"/>
           </a:xfrm>
           <a:prstGeom prst="rect">
             <a:avLst/>
@@ -1181,7 +1183,7 @@
         </p:spPr>
         <p:txBody>
           <a:bodyPr lIns="0" rIns="0" tIns="0" bIns="0" anchor="t">
-            <a:normAutofit/>
+            <a:normAutofit fontScale="84366"/>
           </a:bodyPr>
           <a:p>
             <a:pPr indent="0">
@@ -1211,8 +1213,8 @@
         </p:nvSpPr>
         <p:spPr>
           <a:xfrm>
-            <a:off x="4319280" y="3682080"/>
-            <a:ext cx="3532680" cy="1896840"/>
+            <a:off x="2418840" y="2595240"/>
+            <a:ext cx="1723320" cy="904320"/>
           </a:xfrm>
           <a:prstGeom prst="rect">
             <a:avLst/>
@@ -1224,7 +1226,7 @@
         </p:spPr>
         <p:txBody>
           <a:bodyPr lIns="0" rIns="0" tIns="0" bIns="0" anchor="t">
-            <a:normAutofit/>
+            <a:normAutofit fontScale="84366"/>
           </a:bodyPr>
           <a:p>
             <a:pPr indent="0">
@@ -1254,8 +1256,8 @@
         </p:nvSpPr>
         <p:spPr>
           <a:xfrm>
-            <a:off x="8028720" y="3682080"/>
-            <a:ext cx="3532680" cy="1896840"/>
+            <a:off x="4228920" y="2595240"/>
+            <a:ext cx="1723320" cy="904320"/>
           </a:xfrm>
           <a:prstGeom prst="rect">
             <a:avLst/>
@@ -1267,7 +1269,7 @@
         </p:spPr>
         <p:txBody>
           <a:bodyPr lIns="0" rIns="0" tIns="0" bIns="0" anchor="t">
-            <a:normAutofit/>
+            <a:normAutofit fontScale="84366"/>
           </a:bodyPr>
           <a:p>
             <a:pPr indent="0">
@@ -1319,7 +1321,7 @@
         <p:txBody>
           <a:bodyPr/>
           <a:p>
-            <a:fld id="{EE25A9D5-7E4A-43C1-9058-9FDABA364DE3}" type="slidenum">
+            <a:fld id="{91F69924-2EA6-4E21-B6FB-06A7CB28E2DD}" type="slidenum">
               <a:t>&lt;#&gt;</a:t>
             </a:fld>
           </a:p>
@@ -1380,8 +1382,8 @@
         </p:nvSpPr>
         <p:spPr>
           <a:xfrm>
-            <a:off x="609480" y="273600"/>
-            <a:ext cx="10972080" cy="1144440"/>
+            <a:off x="609120" y="273600"/>
+            <a:ext cx="10968840" cy="1144080"/>
           </a:xfrm>
           <a:prstGeom prst="rect">
             <a:avLst/>
@@ -1420,8 +1422,8 @@
         </p:nvSpPr>
         <p:spPr>
           <a:xfrm>
-            <a:off x="609480" y="1604520"/>
-            <a:ext cx="10972080" cy="3976920"/>
+            <a:off x="609120" y="1604520"/>
+            <a:ext cx="5352480" cy="1896480"/>
           </a:xfrm>
           <a:prstGeom prst="rect">
             <a:avLst/>
@@ -1482,7 +1484,7 @@
         <p:txBody>
           <a:bodyPr/>
           <a:p>
-            <a:fld id="{8EF18F54-C973-4DC2-8FD0-C4AAAE410766}" type="slidenum">
+            <a:fld id="{5E77D3DF-CB11-4096-883E-92C6DA79A683}" type="slidenum">
               <a:t>&lt;#&gt;</a:t>
             </a:fld>
           </a:p>
@@ -1543,8 +1545,8 @@
         </p:nvSpPr>
         <p:spPr>
           <a:xfrm>
-            <a:off x="609480" y="273600"/>
-            <a:ext cx="10972080" cy="1144440"/>
+            <a:off x="609120" y="273600"/>
+            <a:ext cx="10968840" cy="1144080"/>
           </a:xfrm>
           <a:prstGeom prst="rect">
             <a:avLst/>
@@ -1583,8 +1585,8 @@
         </p:nvSpPr>
         <p:spPr>
           <a:xfrm>
-            <a:off x="609480" y="1604520"/>
-            <a:ext cx="10972080" cy="3976920"/>
+            <a:off x="609120" y="1604520"/>
+            <a:ext cx="5352480" cy="1896480"/>
           </a:xfrm>
           <a:prstGeom prst="rect">
             <a:avLst/>
@@ -1648,7 +1650,7 @@
         <p:txBody>
           <a:bodyPr/>
           <a:p>
-            <a:fld id="{B3CCD7B8-FFCB-44CB-9639-D65E24366556}" type="slidenum">
+            <a:fld id="{9BCB5F24-7B1D-43E7-9C5E-4896A85695BF}" type="slidenum">
               <a:t>&lt;#&gt;</a:t>
             </a:fld>
           </a:p>
@@ -1709,8 +1711,8 @@
         </p:nvSpPr>
         <p:spPr>
           <a:xfrm>
-            <a:off x="609480" y="273600"/>
-            <a:ext cx="10972080" cy="1144440"/>
+            <a:off x="609120" y="273600"/>
+            <a:ext cx="10968840" cy="1144080"/>
           </a:xfrm>
           <a:prstGeom prst="rect">
             <a:avLst/>
@@ -1749,8 +1751,8 @@
         </p:nvSpPr>
         <p:spPr>
           <a:xfrm>
-            <a:off x="609480" y="1604520"/>
-            <a:ext cx="5354280" cy="3976920"/>
+            <a:off x="609120" y="1604520"/>
+            <a:ext cx="2611800" cy="1896480"/>
           </a:xfrm>
           <a:prstGeom prst="rect">
             <a:avLst/>
@@ -1792,8 +1794,8 @@
         </p:nvSpPr>
         <p:spPr>
           <a:xfrm>
-            <a:off x="6231960" y="1604520"/>
-            <a:ext cx="5354280" cy="3976920"/>
+            <a:off x="3351960" y="1604520"/>
+            <a:ext cx="2611800" cy="1896480"/>
           </a:xfrm>
           <a:prstGeom prst="rect">
             <a:avLst/>
@@ -1857,7 +1859,7 @@
         <p:txBody>
           <a:bodyPr/>
           <a:p>
-            <a:fld id="{0B1ECCE9-E3B2-4EF4-B6FF-E9DC2EE53C51}" type="slidenum">
+            <a:fld id="{01C7BE4D-D913-4F71-941C-B8355141A39B}" type="slidenum">
               <a:t>&lt;#&gt;</a:t>
             </a:fld>
           </a:p>
@@ -1918,8 +1920,8 @@
         </p:nvSpPr>
         <p:spPr>
           <a:xfrm>
-            <a:off x="609480" y="273600"/>
-            <a:ext cx="10972080" cy="1144440"/>
+            <a:off x="609120" y="273600"/>
+            <a:ext cx="10968840" cy="1144080"/>
           </a:xfrm>
           <a:prstGeom prst="rect">
             <a:avLst/>
@@ -1980,7 +1982,7 @@
         <p:txBody>
           <a:bodyPr/>
           <a:p>
-            <a:fld id="{B5CB86FE-3630-4CFB-B827-6C1464E2DCE8}" type="slidenum">
+            <a:fld id="{3A0D072F-DD40-45CA-BDBD-0572F6C5ABE1}" type="slidenum">
               <a:t>&lt;#&gt;</a:t>
             </a:fld>
           </a:p>
@@ -2041,8 +2043,8 @@
         </p:nvSpPr>
         <p:spPr>
           <a:xfrm>
-            <a:off x="609480" y="273600"/>
-            <a:ext cx="10972080" cy="5306400"/>
+            <a:off x="609120" y="273600"/>
+            <a:ext cx="10968840" cy="5304600"/>
           </a:xfrm>
           <a:prstGeom prst="rect">
             <a:avLst/>
@@ -2101,7 +2103,7 @@
         <p:txBody>
           <a:bodyPr/>
           <a:p>
-            <a:fld id="{A0EA314E-B4E1-4320-B008-AFFCCBAD2875}" type="slidenum">
+            <a:fld id="{FCBB776A-F069-461F-BB3E-7CDD6FF25CBF}" type="slidenum">
               <a:t>&lt;#&gt;</a:t>
             </a:fld>
           </a:p>
@@ -2162,8 +2164,8 @@
         </p:nvSpPr>
         <p:spPr>
           <a:xfrm>
-            <a:off x="609480" y="273600"/>
-            <a:ext cx="10972080" cy="1144440"/>
+            <a:off x="609120" y="273600"/>
+            <a:ext cx="10968840" cy="1144080"/>
           </a:xfrm>
           <a:prstGeom prst="rect">
             <a:avLst/>
@@ -2202,8 +2204,8 @@
         </p:nvSpPr>
         <p:spPr>
           <a:xfrm>
-            <a:off x="609480" y="1604520"/>
-            <a:ext cx="5354280" cy="1896840"/>
+            <a:off x="609120" y="1604520"/>
+            <a:ext cx="2611800" cy="904320"/>
           </a:xfrm>
           <a:prstGeom prst="rect">
             <a:avLst/>
@@ -2245,8 +2247,8 @@
         </p:nvSpPr>
         <p:spPr>
           <a:xfrm>
-            <a:off x="6231960" y="1604520"/>
-            <a:ext cx="5354280" cy="3976920"/>
+            <a:off x="3351960" y="1604520"/>
+            <a:ext cx="2611800" cy="1896480"/>
           </a:xfrm>
           <a:prstGeom prst="rect">
             <a:avLst/>
@@ -2288,8 +2290,8 @@
         </p:nvSpPr>
         <p:spPr>
           <a:xfrm>
-            <a:off x="609480" y="3682080"/>
-            <a:ext cx="5354280" cy="1896840"/>
+            <a:off x="609120" y="2595240"/>
+            <a:ext cx="2611800" cy="904320"/>
           </a:xfrm>
           <a:prstGeom prst="rect">
             <a:avLst/>
@@ -2353,7 +2355,7 @@
         <p:txBody>
           <a:bodyPr/>
           <a:p>
-            <a:fld id="{92CC0EFC-F988-4319-B23F-4C6945CDA60B}" type="slidenum">
+            <a:fld id="{A37CC7C6-33A5-4EE1-93CE-16E4B4EFDC7D}" type="slidenum">
               <a:t>&lt;#&gt;</a:t>
             </a:fld>
           </a:p>
@@ -2414,8 +2416,8 @@
         </p:nvSpPr>
         <p:spPr>
           <a:xfrm>
-            <a:off x="609480" y="273600"/>
-            <a:ext cx="10972080" cy="1144440"/>
+            <a:off x="609120" y="273600"/>
+            <a:ext cx="10968840" cy="1144080"/>
           </a:xfrm>
           <a:prstGeom prst="rect">
             <a:avLst/>
@@ -2454,8 +2456,8 @@
         </p:nvSpPr>
         <p:spPr>
           <a:xfrm>
-            <a:off x="609480" y="1604520"/>
-            <a:ext cx="5354280" cy="3976920"/>
+            <a:off x="609120" y="1604520"/>
+            <a:ext cx="2611800" cy="1896480"/>
           </a:xfrm>
           <a:prstGeom prst="rect">
             <a:avLst/>
@@ -2497,8 +2499,8 @@
         </p:nvSpPr>
         <p:spPr>
           <a:xfrm>
-            <a:off x="6231960" y="1604520"/>
-            <a:ext cx="5354280" cy="1896840"/>
+            <a:off x="3351960" y="1604520"/>
+            <a:ext cx="2611800" cy="904320"/>
           </a:xfrm>
           <a:prstGeom prst="rect">
             <a:avLst/>
@@ -2540,8 +2542,8 @@
         </p:nvSpPr>
         <p:spPr>
           <a:xfrm>
-            <a:off x="6231960" y="3682080"/>
-            <a:ext cx="5354280" cy="1896840"/>
+            <a:off x="3351960" y="2595240"/>
+            <a:ext cx="2611800" cy="904320"/>
           </a:xfrm>
           <a:prstGeom prst="rect">
             <a:avLst/>
@@ -2605,7 +2607,7 @@
         <p:txBody>
           <a:bodyPr/>
           <a:p>
-            <a:fld id="{3618E3EC-D9DF-4ED7-9DD2-961BAC8DC6DF}" type="slidenum">
+            <a:fld id="{9CBAE0B5-9988-4E4A-B7E0-357E660BE55C}" type="slidenum">
               <a:t>&lt;#&gt;</a:t>
             </a:fld>
           </a:p>
@@ -2666,8 +2668,8 @@
         </p:nvSpPr>
         <p:spPr>
           <a:xfrm>
-            <a:off x="609480" y="273600"/>
-            <a:ext cx="10972080" cy="1144440"/>
+            <a:off x="609120" y="273600"/>
+            <a:ext cx="10968840" cy="1144080"/>
           </a:xfrm>
           <a:prstGeom prst="rect">
             <a:avLst/>
@@ -2706,8 +2708,8 @@
         </p:nvSpPr>
         <p:spPr>
           <a:xfrm>
-            <a:off x="609480" y="1604520"/>
-            <a:ext cx="5354280" cy="1896840"/>
+            <a:off x="609120" y="1604520"/>
+            <a:ext cx="2611800" cy="904320"/>
           </a:xfrm>
           <a:prstGeom prst="rect">
             <a:avLst/>
@@ -2749,8 +2751,8 @@
         </p:nvSpPr>
         <p:spPr>
           <a:xfrm>
-            <a:off x="6231960" y="1604520"/>
-            <a:ext cx="5354280" cy="1896840"/>
+            <a:off x="3351960" y="1604520"/>
+            <a:ext cx="2611800" cy="904320"/>
           </a:xfrm>
           <a:prstGeom prst="rect">
             <a:avLst/>
@@ -2792,8 +2794,8 @@
         </p:nvSpPr>
         <p:spPr>
           <a:xfrm>
-            <a:off x="609480" y="3682080"/>
-            <a:ext cx="10972080" cy="1896840"/>
+            <a:off x="609120" y="2595240"/>
+            <a:ext cx="5352480" cy="904320"/>
           </a:xfrm>
           <a:prstGeom prst="rect">
             <a:avLst/>
@@ -2857,7 +2859,7 @@
         <p:txBody>
           <a:bodyPr/>
           <a:p>
-            <a:fld id="{C9B26B96-F5C8-4FA0-B267-3475EFD27117}" type="slidenum">
+            <a:fld id="{37644AFB-454A-4C69-8FCD-C3E1D87A48EA}" type="slidenum">
               <a:t>&lt;#&gt;</a:t>
             </a:fld>
           </a:p>
@@ -2925,8 +2927,8 @@
         </p:nvSpPr>
         <p:spPr>
           <a:xfrm>
-            <a:off x="609480" y="273600"/>
-            <a:ext cx="10972080" cy="1144440"/>
+            <a:off x="609120" y="273600"/>
+            <a:ext cx="10968840" cy="1144080"/>
           </a:xfrm>
           <a:prstGeom prst="rect">
             <a:avLst/>
@@ -2974,8 +2976,8 @@
         </p:nvSpPr>
         <p:spPr>
           <a:xfrm>
-            <a:off x="609480" y="1604520"/>
-            <a:ext cx="5353920" cy="1896480"/>
+            <a:off x="609120" y="1604520"/>
+            <a:ext cx="5352480" cy="1896480"/>
           </a:xfrm>
           <a:prstGeom prst="rect">
             <a:avLst/>
@@ -3199,8 +3201,8 @@
         </p:nvSpPr>
         <p:spPr>
           <a:xfrm>
-            <a:off x="6231960" y="1604520"/>
-            <a:ext cx="5353920" cy="1896480"/>
+            <a:off x="6230160" y="1604520"/>
+            <a:ext cx="5352480" cy="1896480"/>
           </a:xfrm>
           <a:prstGeom prst="rect">
             <a:avLst/>
@@ -3424,8 +3426,8 @@
         </p:nvSpPr>
         <p:spPr>
           <a:xfrm>
-            <a:off x="609480" y="3682080"/>
-            <a:ext cx="10972080" cy="1896480"/>
+            <a:off x="609120" y="3682080"/>
+            <a:ext cx="10968840" cy="1896480"/>
           </a:xfrm>
           <a:prstGeom prst="rect">
             <a:avLst/>
@@ -3649,8 +3651,8 @@
         </p:nvSpPr>
         <p:spPr>
           <a:xfrm>
-            <a:off x="4038480" y="6356520"/>
-            <a:ext cx="4114080" cy="364320"/>
+            <a:off x="4037400" y="6356520"/>
+            <a:ext cx="4112640" cy="363960"/>
           </a:xfrm>
           <a:prstGeom prst="rect">
             <a:avLst/>
@@ -3721,8 +3723,8 @@
         </p:nvSpPr>
         <p:spPr>
           <a:xfrm>
-            <a:off x="8610480" y="6356520"/>
-            <a:ext cx="2742480" cy="364320"/>
+            <a:off x="8607960" y="6356520"/>
+            <a:ext cx="2741400" cy="363960"/>
           </a:xfrm>
           <a:prstGeom prst="rect">
             <a:avLst/>
@@ -3765,7 +3767,7 @@
                 <a:tab algn="l" pos="0"/>
               </a:tabLst>
             </a:pPr>
-            <a:fld id="{E634B02D-352C-48CD-B08D-EF2B5D917506}" type="slidenum">
+            <a:fld id="{0896B86F-292E-4FF4-B908-18219C7B2E55}" type="slidenum">
               <a:rPr b="0" lang="el-GR" sz="1200" spc="-1" strike="noStrike">
                 <a:solidFill>
                   <a:schemeClr val="dk1">
@@ -3797,8 +3799,8 @@
         </p:nvSpPr>
         <p:spPr>
           <a:xfrm>
-            <a:off x="838080" y="6356520"/>
-            <a:ext cx="2742480" cy="364320"/>
+            <a:off x="837720" y="6356520"/>
+            <a:ext cx="2741400" cy="363960"/>
           </a:xfrm>
           <a:prstGeom prst="rect">
             <a:avLst/>
@@ -3894,8 +3896,8 @@
         </p:nvSpPr>
         <p:spPr>
           <a:xfrm>
-            <a:off x="500040" y="304200"/>
-            <a:ext cx="10972080" cy="3169800"/>
+            <a:off x="499680" y="304200"/>
+            <a:ext cx="10968840" cy="3169440"/>
           </a:xfrm>
           <a:prstGeom prst="rect">
             <a:avLst/>
@@ -3911,7 +3913,13 @@
           </a:bodyPr>
           <a:p>
             <a:pPr indent="0" algn="ctr">
+              <a:lnSpc>
+                <a:spcPct val="100000"/>
+              </a:lnSpc>
               <a:buNone/>
+              <a:tabLst>
+                <a:tab algn="l" pos="0"/>
+              </a:tabLst>
             </a:pPr>
             <a:r>
               <a:rPr b="0" lang="en-US" sz="4400" spc="-1" strike="noStrike">
@@ -3920,133 +3928,7 @@
                 </a:solidFill>
                 <a:latin typeface="Arial"/>
               </a:rPr>
-              <a:t>Life </a:t>
-            </a:r>
-            <a:r>
-              <a:rPr b="0" lang="en-US" sz="4400" spc="-1" strike="noStrike">
-                <a:solidFill>
-                  <a:srgbClr val="000000"/>
-                </a:solidFill>
-                <a:latin typeface="Arial"/>
-              </a:rPr>
-              <a:t>Cycle </a:t>
-            </a:r>
-            <a:r>
-              <a:rPr b="0" lang="en-US" sz="4400" spc="-1" strike="noStrike">
-                <a:solidFill>
-                  <a:srgbClr val="000000"/>
-                </a:solidFill>
-                <a:latin typeface="Arial"/>
-              </a:rPr>
-              <a:t>Impact </a:t>
-            </a:r>
-            <a:r>
-              <a:rPr b="0" lang="en-US" sz="4400" spc="-1" strike="noStrike">
-                <a:solidFill>
-                  <a:srgbClr val="000000"/>
-                </a:solidFill>
-                <a:latin typeface="Arial"/>
-              </a:rPr>
-              <a:t>Assess</a:t>
-            </a:r>
-            <a:r>
-              <a:rPr b="0" lang="en-US" sz="4400" spc="-1" strike="noStrike">
-                <a:solidFill>
-                  <a:srgbClr val="000000"/>
-                </a:solidFill>
-                <a:latin typeface="Arial"/>
-              </a:rPr>
-              <a:t>ment of </a:t>
-            </a:r>
-            <a:r>
-              <a:rPr b="0" lang="en-US" sz="4400" spc="-1" strike="noStrike">
-                <a:solidFill>
-                  <a:srgbClr val="000000"/>
-                </a:solidFill>
-                <a:latin typeface="Arial"/>
-              </a:rPr>
-              <a:t>Cyclop</a:t>
-            </a:r>
-            <a:r>
-              <a:rPr b="0" lang="en-US" sz="4400" spc="-1" strike="noStrike">
-                <a:solidFill>
-                  <a:srgbClr val="000000"/>
-                </a:solidFill>
-                <a:latin typeface="Arial"/>
-              </a:rPr>
-              <a:t>entano</a:t>
-            </a:r>
-            <a:r>
-              <a:rPr b="0" lang="en-US" sz="4400" spc="-1" strike="noStrike">
-                <a:solidFill>
-                  <a:srgbClr val="000000"/>
-                </a:solidFill>
-                <a:latin typeface="Arial"/>
-              </a:rPr>
-              <a:t>ne </a:t>
-            </a:r>
-            <a:r>
-              <a:rPr b="0" lang="en-US" sz="4400" spc="-1" strike="noStrike">
-                <a:solidFill>
-                  <a:srgbClr val="000000"/>
-                </a:solidFill>
-                <a:latin typeface="Arial"/>
-              </a:rPr>
-              <a:t>Produc</a:t>
-            </a:r>
-            <a:r>
-              <a:rPr b="0" lang="en-US" sz="4400" spc="-1" strike="noStrike">
-                <a:solidFill>
-                  <a:srgbClr val="000000"/>
-                </a:solidFill>
-                <a:latin typeface="Arial"/>
-              </a:rPr>
-              <a:t>tion </a:t>
-            </a:r>
-            <a:r>
-              <a:rPr b="0" lang="en-US" sz="4400" spc="-1" strike="noStrike">
-                <a:solidFill>
-                  <a:srgbClr val="000000"/>
-                </a:solidFill>
-                <a:latin typeface="Arial"/>
-              </a:rPr>
-              <a:t>from a </a:t>
-            </a:r>
-            <a:r>
-              <a:rPr b="0" lang="en-US" sz="4400" spc="-1" strike="noStrike">
-                <a:solidFill>
-                  <a:srgbClr val="000000"/>
-                </a:solidFill>
-                <a:latin typeface="Arial"/>
-              </a:rPr>
-              <a:t>biomas</a:t>
-            </a:r>
-            <a:r>
-              <a:rPr b="0" lang="en-US" sz="4400" spc="-1" strike="noStrike">
-                <a:solidFill>
-                  <a:srgbClr val="000000"/>
-                </a:solidFill>
-                <a:latin typeface="Arial"/>
-              </a:rPr>
-              <a:t>s and a </a:t>
-            </a:r>
-            <a:r>
-              <a:rPr b="0" lang="en-US" sz="4400" spc="-1" strike="noStrike">
-                <a:solidFill>
-                  <a:srgbClr val="000000"/>
-                </a:solidFill>
-                <a:latin typeface="Arial"/>
-              </a:rPr>
-              <a:t>petrelai</a:t>
-            </a:r>
-            <a:r>
-              <a:rPr b="0" lang="en-US" sz="4400" spc="-1" strike="noStrike">
-                <a:solidFill>
-                  <a:srgbClr val="000000"/>
-                </a:solidFill>
-                <a:latin typeface="Arial"/>
-              </a:rPr>
-              <a:t>c route</a:t>
+              <a:t>Life Cycle Impact Assessment of Cyclopentanone Production from a biomass and a petrelaic route</a:t>
             </a:r>
             <a:endParaRPr b="0" lang="en-US" sz="4400" spc="-1" strike="noStrike">
               <a:solidFill>
@@ -4069,8 +3951,8 @@
         </p:nvSpPr>
         <p:spPr>
           <a:xfrm>
-            <a:off x="2272320" y="4145760"/>
-            <a:ext cx="7807320" cy="1077480"/>
+            <a:off x="2271600" y="4145760"/>
+            <a:ext cx="7804800" cy="1077120"/>
           </a:xfrm>
           <a:prstGeom prst="rect">
             <a:avLst/>
@@ -4086,10 +3968,16 @@
           </a:bodyPr>
           <a:p>
             <a:pPr marL="432000" indent="0">
+              <a:lnSpc>
+                <a:spcPct val="100000"/>
+              </a:lnSpc>
               <a:spcBef>
                 <a:spcPts val="1417"/>
               </a:spcBef>
               <a:buNone/>
+              <a:tabLst>
+                <a:tab algn="l" pos="0"/>
+              </a:tabLst>
             </a:pPr>
             <a:r>
               <a:rPr b="0" lang="en-US" sz="3200" spc="-1" strike="noStrike">
@@ -4151,8 +4039,8 @@
         </p:nvSpPr>
         <p:spPr>
           <a:xfrm>
-            <a:off x="609480" y="273240"/>
-            <a:ext cx="10972080" cy="1144440"/>
+            <a:off x="609120" y="273240"/>
+            <a:ext cx="10968840" cy="1144080"/>
           </a:xfrm>
           <a:prstGeom prst="rect">
             <a:avLst/>
@@ -4183,52 +4071,7 @@
                 </a:solidFill>
                 <a:latin typeface="Arial"/>
               </a:rPr>
-              <a:t>Ba(</a:t>
-            </a:r>
-            <a:r>
-              <a:rPr b="0" lang="en-US" sz="4400" spc="-1" strike="noStrike">
-                <a:solidFill>
-                  <a:srgbClr val="000000"/>
-                </a:solidFill>
-                <a:latin typeface="Arial"/>
-              </a:rPr>
-              <a:t>OH</a:t>
-            </a:r>
-            <a:r>
-              <a:rPr b="0" lang="en-US" sz="4400" spc="-1" strike="noStrike">
-                <a:solidFill>
-                  <a:srgbClr val="000000"/>
-                </a:solidFill>
-                <a:latin typeface="Arial"/>
-              </a:rPr>
-              <a:t>)2 </a:t>
-            </a:r>
-            <a:r>
-              <a:rPr b="0" lang="en-US" sz="4400" spc="-1" strike="noStrike">
-                <a:solidFill>
-                  <a:srgbClr val="000000"/>
-                </a:solidFill>
-                <a:latin typeface="Arial"/>
-              </a:rPr>
-              <a:t>Pro</a:t>
-            </a:r>
-            <a:r>
-              <a:rPr b="0" lang="en-US" sz="4400" spc="-1" strike="noStrike">
-                <a:solidFill>
-                  <a:srgbClr val="000000"/>
-                </a:solidFill>
-                <a:latin typeface="Arial"/>
-              </a:rPr>
-              <a:t>duc</a:t>
-            </a:r>
-            <a:r>
-              <a:rPr b="0" lang="en-US" sz="4400" spc="-1" strike="noStrike">
-                <a:solidFill>
-                  <a:srgbClr val="000000"/>
-                </a:solidFill>
-                <a:latin typeface="Arial"/>
-              </a:rPr>
-              <a:t>tion</a:t>
+              <a:t>Ba(OH)2 Production</a:t>
             </a:r>
             <a:endParaRPr b="0" lang="en-US" sz="4400" spc="-1" strike="noStrike">
               <a:solidFill>
@@ -4251,8 +4094,8 @@
         </p:nvSpPr>
         <p:spPr>
           <a:xfrm>
-            <a:off x="609480" y="1604520"/>
-            <a:ext cx="10972080" cy="3976920"/>
+            <a:off x="609120" y="1604520"/>
+            <a:ext cx="10968840" cy="3976560"/>
           </a:xfrm>
           <a:prstGeom prst="rect">
             <a:avLst/>
@@ -4341,8 +4184,8 @@
         </p:nvSpPr>
         <p:spPr>
           <a:xfrm>
-            <a:off x="609480" y="273600"/>
-            <a:ext cx="10972080" cy="1144440"/>
+            <a:off x="609120" y="273600"/>
+            <a:ext cx="10968840" cy="1144080"/>
           </a:xfrm>
           <a:prstGeom prst="rect">
             <a:avLst/>
@@ -4358,7 +4201,13 @@
           </a:bodyPr>
           <a:p>
             <a:pPr indent="0" algn="ctr">
+              <a:lnSpc>
+                <a:spcPct val="100000"/>
+              </a:lnSpc>
               <a:buNone/>
+              <a:tabLst>
+                <a:tab algn="l" pos="0"/>
+              </a:tabLst>
             </a:pPr>
             <a:r>
               <a:rPr b="0" lang="en-US" sz="4400" spc="-1" strike="noStrike">
@@ -4367,52 +4216,7 @@
                 </a:solidFill>
                 <a:latin typeface="Arial"/>
               </a:rPr>
-              <a:t>LCI </a:t>
-            </a:r>
-            <a:r>
-              <a:rPr b="0" lang="en-US" sz="4400" spc="-1" strike="noStrike">
-                <a:solidFill>
-                  <a:srgbClr val="000000"/>
-                </a:solidFill>
-                <a:latin typeface="Arial"/>
-              </a:rPr>
-              <a:t>of </a:t>
-            </a:r>
-            <a:r>
-              <a:rPr b="0" lang="en-US" sz="4400" spc="-1" strike="noStrike">
-                <a:solidFill>
-                  <a:srgbClr val="000000"/>
-                </a:solidFill>
-                <a:latin typeface="Arial"/>
-              </a:rPr>
-              <a:t>the </a:t>
-            </a:r>
-            <a:r>
-              <a:rPr b="0" lang="en-US" sz="4400" spc="-1" strike="noStrike">
-                <a:solidFill>
-                  <a:srgbClr val="000000"/>
-                </a:solidFill>
-                <a:latin typeface="Arial"/>
-              </a:rPr>
-              <a:t>pro</a:t>
-            </a:r>
-            <a:r>
-              <a:rPr b="0" lang="en-US" sz="4400" spc="-1" strike="noStrike">
-                <a:solidFill>
-                  <a:srgbClr val="000000"/>
-                </a:solidFill>
-                <a:latin typeface="Arial"/>
-              </a:rPr>
-              <a:t>ces</a:t>
-            </a:r>
-            <a:r>
-              <a:rPr b="0" lang="en-US" sz="4400" spc="-1" strike="noStrike">
-                <a:solidFill>
-                  <a:srgbClr val="000000"/>
-                </a:solidFill>
-                <a:latin typeface="Arial"/>
-              </a:rPr>
-              <a:t>s</a:t>
+              <a:t>LCI of the process</a:t>
             </a:r>
             <a:endParaRPr b="0" lang="en-US" sz="4400" spc="-1" strike="noStrike">
               <a:solidFill>
@@ -4435,8 +4239,8 @@
         </p:blipFill>
         <p:spPr>
           <a:xfrm>
-            <a:off x="860760" y="1331640"/>
-            <a:ext cx="10338480" cy="2697120"/>
+            <a:off x="860400" y="1331640"/>
+            <a:ext cx="10335240" cy="2696760"/>
           </a:xfrm>
           <a:prstGeom prst="rect">
             <a:avLst/>
@@ -4449,13 +4253,13 @@
       <p:sp>
         <p:nvSpPr>
           <p:cNvPr id="72" name=""/>
-          <p:cNvSpPr txBox="1"/>
+          <p:cNvSpPr/>
           <p:nvPr/>
         </p:nvSpPr>
         <p:spPr>
           <a:xfrm>
-            <a:off x="1085400" y="4387680"/>
-            <a:ext cx="9868320" cy="1449720"/>
+            <a:off x="1085040" y="4387680"/>
+            <a:ext cx="9865440" cy="1449360"/>
           </a:xfrm>
           <a:prstGeom prst="rect">
             <a:avLst/>
@@ -4465,11 +4269,22 @@
             <a:noFill/>
           </a:ln>
         </p:spPr>
+        <p:style>
+          <a:lnRef idx="0"/>
+          <a:fillRef idx="0"/>
+          <a:effectRef idx="0"/>
+          <a:fontRef idx="minor"/>
+        </p:style>
         <p:txBody>
           <a:bodyPr lIns="90000" rIns="90000" tIns="45000" bIns="45000" anchor="t">
             <a:noAutofit/>
           </a:bodyPr>
           <a:p>
+            <a:pPr>
+              <a:lnSpc>
+                <a:spcPct val="100000"/>
+              </a:lnSpc>
+            </a:pPr>
             <a:r>
               <a:rPr b="0" lang="en-US" sz="2400" spc="-1" strike="noStrike">
                 <a:solidFill>
@@ -4477,8 +4292,34 @@
                 </a:solidFill>
                 <a:latin typeface="Arial"/>
               </a:rPr>
-              <a:t>Energy </a:t>
+              <a:t>Energy data: 2 MJ/f.u. heat (modelled as heavy fuel oil), 2.2 MJ/f.u. electricity (electricity mix, Greece), 0.92 MJ/f.u. cooling (water)</a:t>
             </a:r>
+            <a:endParaRPr b="0" lang="en-US" sz="2400" spc="-1" strike="noStrike">
+              <a:solidFill>
+                <a:srgbClr val="000000"/>
+              </a:solidFill>
+              <a:latin typeface="Arial"/>
+            </a:endParaRPr>
+          </a:p>
+          <a:p>
+            <a:pPr>
+              <a:lnSpc>
+                <a:spcPct val="100000"/>
+              </a:lnSpc>
+            </a:pPr>
+            <a:endParaRPr b="0" lang="en-US" sz="2400" spc="-1" strike="noStrike">
+              <a:solidFill>
+                <a:srgbClr val="000000"/>
+              </a:solidFill>
+              <a:latin typeface="Arial"/>
+            </a:endParaRPr>
+          </a:p>
+          <a:p>
+            <a:pPr>
+              <a:lnSpc>
+                <a:spcPct val="100000"/>
+              </a:lnSpc>
+            </a:pPr>
             <a:r>
               <a:rPr b="0" lang="en-US" sz="2400" spc="-1" strike="noStrike">
                 <a:solidFill>
@@ -4486,320 +4327,7 @@
                 </a:solidFill>
                 <a:latin typeface="Arial"/>
               </a:rPr>
-              <a:t>data: 2 </a:t>
-            </a:r>
-            <a:r>
-              <a:rPr b="0" lang="en-US" sz="2400" spc="-1" strike="noStrike">
-                <a:solidFill>
-                  <a:srgbClr val="000000"/>
-                </a:solidFill>
-                <a:latin typeface="Arial"/>
-              </a:rPr>
-              <a:t>MJ/f.u. </a:t>
-            </a:r>
-            <a:r>
-              <a:rPr b="0" lang="en-US" sz="2400" spc="-1" strike="noStrike">
-                <a:solidFill>
-                  <a:srgbClr val="000000"/>
-                </a:solidFill>
-                <a:latin typeface="Arial"/>
-              </a:rPr>
-              <a:t>heat </a:t>
-            </a:r>
-            <a:r>
-              <a:rPr b="0" lang="en-US" sz="2400" spc="-1" strike="noStrike">
-                <a:solidFill>
-                  <a:srgbClr val="000000"/>
-                </a:solidFill>
-                <a:latin typeface="Arial"/>
-              </a:rPr>
-              <a:t>(model</a:t>
-            </a:r>
-            <a:r>
-              <a:rPr b="0" lang="en-US" sz="2400" spc="-1" strike="noStrike">
-                <a:solidFill>
-                  <a:srgbClr val="000000"/>
-                </a:solidFill>
-                <a:latin typeface="Arial"/>
-              </a:rPr>
-              <a:t>led as </a:t>
-            </a:r>
-            <a:r>
-              <a:rPr b="0" lang="en-US" sz="2400" spc="-1" strike="noStrike">
-                <a:solidFill>
-                  <a:srgbClr val="000000"/>
-                </a:solidFill>
-                <a:latin typeface="Arial"/>
-              </a:rPr>
-              <a:t>heavy </a:t>
-            </a:r>
-            <a:r>
-              <a:rPr b="0" lang="en-US" sz="2400" spc="-1" strike="noStrike">
-                <a:solidFill>
-                  <a:srgbClr val="000000"/>
-                </a:solidFill>
-                <a:latin typeface="Arial"/>
-              </a:rPr>
-              <a:t>fuel </a:t>
-            </a:r>
-            <a:r>
-              <a:rPr b="0" lang="en-US" sz="2400" spc="-1" strike="noStrike">
-                <a:solidFill>
-                  <a:srgbClr val="000000"/>
-                </a:solidFill>
-                <a:latin typeface="Arial"/>
-              </a:rPr>
-              <a:t>oil), </a:t>
-            </a:r>
-            <a:r>
-              <a:rPr b="0" lang="en-US" sz="2400" spc="-1" strike="noStrike">
-                <a:solidFill>
-                  <a:srgbClr val="000000"/>
-                </a:solidFill>
-                <a:latin typeface="Arial"/>
-              </a:rPr>
-              <a:t>2.2 </a:t>
-            </a:r>
-            <a:r>
-              <a:rPr b="0" lang="en-US" sz="2400" spc="-1" strike="noStrike">
-                <a:solidFill>
-                  <a:srgbClr val="000000"/>
-                </a:solidFill>
-                <a:latin typeface="Arial"/>
-              </a:rPr>
-              <a:t>MJ/f.u. </a:t>
-            </a:r>
-            <a:r>
-              <a:rPr b="0" lang="en-US" sz="2400" spc="-1" strike="noStrike">
-                <a:solidFill>
-                  <a:srgbClr val="000000"/>
-                </a:solidFill>
-                <a:latin typeface="Arial"/>
-              </a:rPr>
-              <a:t>electric</a:t>
-            </a:r>
-            <a:r>
-              <a:rPr b="0" lang="en-US" sz="2400" spc="-1" strike="noStrike">
-                <a:solidFill>
-                  <a:srgbClr val="000000"/>
-                </a:solidFill>
-                <a:latin typeface="Arial"/>
-              </a:rPr>
-              <a:t>ity </a:t>
-            </a:r>
-            <a:r>
-              <a:rPr b="0" lang="en-US" sz="2400" spc="-1" strike="noStrike">
-                <a:solidFill>
-                  <a:srgbClr val="000000"/>
-                </a:solidFill>
-                <a:latin typeface="Arial"/>
-              </a:rPr>
-              <a:t>(electri</a:t>
-            </a:r>
-            <a:r>
-              <a:rPr b="0" lang="en-US" sz="2400" spc="-1" strike="noStrike">
-                <a:solidFill>
-                  <a:srgbClr val="000000"/>
-                </a:solidFill>
-                <a:latin typeface="Arial"/>
-              </a:rPr>
-              <a:t>city </a:t>
-            </a:r>
-            <a:r>
-              <a:rPr b="0" lang="en-US" sz="2400" spc="-1" strike="noStrike">
-                <a:solidFill>
-                  <a:srgbClr val="000000"/>
-                </a:solidFill>
-                <a:latin typeface="Arial"/>
-              </a:rPr>
-              <a:t>mix, </a:t>
-            </a:r>
-            <a:r>
-              <a:rPr b="0" lang="en-US" sz="2400" spc="-1" strike="noStrike">
-                <a:solidFill>
-                  <a:srgbClr val="000000"/>
-                </a:solidFill>
-                <a:latin typeface="Arial"/>
-              </a:rPr>
-              <a:t>Greec</a:t>
-            </a:r>
-            <a:r>
-              <a:rPr b="0" lang="en-US" sz="2400" spc="-1" strike="noStrike">
-                <a:solidFill>
-                  <a:srgbClr val="000000"/>
-                </a:solidFill>
-                <a:latin typeface="Arial"/>
-              </a:rPr>
-              <a:t>e), </a:t>
-            </a:r>
-            <a:r>
-              <a:rPr b="0" lang="en-US" sz="2400" spc="-1" strike="noStrike">
-                <a:solidFill>
-                  <a:srgbClr val="000000"/>
-                </a:solidFill>
-                <a:latin typeface="Arial"/>
-              </a:rPr>
-              <a:t>0.92 </a:t>
-            </a:r>
-            <a:r>
-              <a:rPr b="0" lang="en-US" sz="2400" spc="-1" strike="noStrike">
-                <a:solidFill>
-                  <a:srgbClr val="000000"/>
-                </a:solidFill>
-                <a:latin typeface="Arial"/>
-              </a:rPr>
-              <a:t>MJ/f.u. </a:t>
-            </a:r>
-            <a:r>
-              <a:rPr b="0" lang="en-US" sz="2400" spc="-1" strike="noStrike">
-                <a:solidFill>
-                  <a:srgbClr val="000000"/>
-                </a:solidFill>
-                <a:latin typeface="Arial"/>
-              </a:rPr>
-              <a:t>cooling </a:t>
-            </a:r>
-            <a:r>
-              <a:rPr b="0" lang="en-US" sz="2400" spc="-1" strike="noStrike">
-                <a:solidFill>
-                  <a:srgbClr val="000000"/>
-                </a:solidFill>
-                <a:latin typeface="Arial"/>
-              </a:rPr>
-              <a:t>(water)</a:t>
-            </a:r>
-            <a:endParaRPr b="0" lang="en-US" sz="2400" spc="-1" strike="noStrike">
-              <a:solidFill>
-                <a:srgbClr val="000000"/>
-              </a:solidFill>
-              <a:latin typeface="Arial"/>
-            </a:endParaRPr>
-          </a:p>
-          <a:p>
-            <a:endParaRPr b="0" lang="en-US" sz="2400" spc="-1" strike="noStrike">
-              <a:solidFill>
-                <a:srgbClr val="000000"/>
-              </a:solidFill>
-              <a:latin typeface="Arial"/>
-            </a:endParaRPr>
-          </a:p>
-          <a:p>
-            <a:r>
-              <a:rPr b="0" lang="en-US" sz="2400" spc="-1" strike="noStrike">
-                <a:solidFill>
-                  <a:srgbClr val="000000"/>
-                </a:solidFill>
-                <a:latin typeface="Arial"/>
-              </a:rPr>
-              <a:t>Emissi</a:t>
-            </a:r>
-            <a:r>
-              <a:rPr b="0" lang="en-US" sz="2400" spc="-1" strike="noStrike">
-                <a:solidFill>
-                  <a:srgbClr val="000000"/>
-                </a:solidFill>
-                <a:latin typeface="Arial"/>
-              </a:rPr>
-              <a:t>ons: </a:t>
-            </a:r>
-            <a:r>
-              <a:rPr b="0" lang="en-US" sz="2400" spc="-1" strike="noStrike">
-                <a:solidFill>
-                  <a:srgbClr val="000000"/>
-                </a:solidFill>
-                <a:latin typeface="Arial"/>
-              </a:rPr>
-              <a:t>0.075 </a:t>
-            </a:r>
-            <a:r>
-              <a:rPr b="0" lang="en-US" sz="2400" spc="-1" strike="noStrike">
-                <a:solidFill>
-                  <a:srgbClr val="000000"/>
-                </a:solidFill>
-                <a:latin typeface="Arial"/>
-              </a:rPr>
-              <a:t>kg </a:t>
-            </a:r>
-            <a:r>
-              <a:rPr b="0" lang="en-US" sz="2400" spc="-1" strike="noStrike">
-                <a:solidFill>
-                  <a:srgbClr val="000000"/>
-                </a:solidFill>
-                <a:latin typeface="Arial"/>
-              </a:rPr>
-              <a:t>CO2/f.</a:t>
-            </a:r>
-            <a:r>
-              <a:rPr b="0" lang="en-US" sz="2400" spc="-1" strike="noStrike">
-                <a:solidFill>
-                  <a:srgbClr val="000000"/>
-                </a:solidFill>
-                <a:latin typeface="Arial"/>
-              </a:rPr>
-              <a:t>u., </a:t>
-            </a:r>
-            <a:r>
-              <a:rPr b="0" lang="en-US" sz="2400" spc="-1" strike="noStrike">
-                <a:solidFill>
-                  <a:srgbClr val="000000"/>
-                </a:solidFill>
-                <a:latin typeface="Arial"/>
-              </a:rPr>
-              <a:t>0.048 </a:t>
-            </a:r>
-            <a:r>
-              <a:rPr b="0" lang="en-US" sz="2400" spc="-1" strike="noStrike">
-                <a:solidFill>
-                  <a:srgbClr val="000000"/>
-                </a:solidFill>
-                <a:latin typeface="Arial"/>
-              </a:rPr>
-              <a:t>kg </a:t>
-            </a:r>
-            <a:r>
-              <a:rPr b="0" lang="en-US" sz="2400" spc="-1" strike="noStrike">
-                <a:solidFill>
-                  <a:srgbClr val="000000"/>
-                </a:solidFill>
-                <a:latin typeface="Arial"/>
-              </a:rPr>
-              <a:t>SO2/f.</a:t>
-            </a:r>
-            <a:r>
-              <a:rPr b="0" lang="en-US" sz="2400" spc="-1" strike="noStrike">
-                <a:solidFill>
-                  <a:srgbClr val="000000"/>
-                </a:solidFill>
-                <a:latin typeface="Arial"/>
-              </a:rPr>
-              <a:t>u., 2.1 </a:t>
-            </a:r>
-            <a:r>
-              <a:rPr b="0" lang="en-US" sz="2400" spc="-1" strike="noStrike">
-                <a:solidFill>
-                  <a:srgbClr val="000000"/>
-                </a:solidFill>
-                <a:latin typeface="Arial"/>
-              </a:rPr>
-              <a:t>kg </a:t>
-            </a:r>
-            <a:r>
-              <a:rPr b="0" lang="en-US" sz="2400" spc="-1" strike="noStrike">
-                <a:solidFill>
-                  <a:srgbClr val="000000"/>
-                </a:solidFill>
-                <a:latin typeface="Arial"/>
-              </a:rPr>
-              <a:t>COD/f.</a:t>
-            </a:r>
-            <a:r>
-              <a:rPr b="0" lang="en-US" sz="2400" spc="-1" strike="noStrike">
-                <a:solidFill>
-                  <a:srgbClr val="000000"/>
-                </a:solidFill>
-                <a:latin typeface="Arial"/>
-              </a:rPr>
-              <a:t>u.</a:t>
+              <a:t>Emissions: 0.075 kg CO2/f.u., 0.048 kg SO2/f.u., 2.1 kg COD/f.u.</a:t>
             </a:r>
             <a:endParaRPr b="0" lang="en-US" sz="2400" spc="-1" strike="noStrike">
               <a:solidFill>
@@ -4852,8 +4380,8 @@
         </p:nvSpPr>
         <p:spPr>
           <a:xfrm>
-            <a:off x="609480" y="273240"/>
-            <a:ext cx="10972080" cy="1144440"/>
+            <a:off x="609120" y="273240"/>
+            <a:ext cx="10968840" cy="1144080"/>
           </a:xfrm>
           <a:prstGeom prst="rect">
             <a:avLst/>
@@ -4884,52 +4412,7 @@
                 </a:solidFill>
                 <a:latin typeface="Arial"/>
               </a:rPr>
-              <a:t>Co</a:t>
-            </a:r>
-            <a:r>
-              <a:rPr b="0" lang="en-US" sz="4400" spc="-1" strike="noStrike">
-                <a:solidFill>
-                  <a:srgbClr val="000000"/>
-                </a:solidFill>
-                <a:latin typeface="Arial"/>
-              </a:rPr>
-              <a:t>mp</a:t>
-            </a:r>
-            <a:r>
-              <a:rPr b="0" lang="en-US" sz="4400" spc="-1" strike="noStrike">
-                <a:solidFill>
-                  <a:srgbClr val="000000"/>
-                </a:solidFill>
-                <a:latin typeface="Arial"/>
-              </a:rPr>
-              <a:t>arat</a:t>
-            </a:r>
-            <a:r>
-              <a:rPr b="0" lang="en-US" sz="4400" spc="-1" strike="noStrike">
-                <a:solidFill>
-                  <a:srgbClr val="000000"/>
-                </a:solidFill>
-                <a:latin typeface="Arial"/>
-              </a:rPr>
-              <a:t>ive </a:t>
-            </a:r>
-            <a:r>
-              <a:rPr b="0" lang="en-US" sz="4400" spc="-1" strike="noStrike">
-                <a:solidFill>
-                  <a:srgbClr val="000000"/>
-                </a:solidFill>
-                <a:latin typeface="Arial"/>
-              </a:rPr>
-              <a:t>LCI</a:t>
-            </a:r>
-            <a:r>
-              <a:rPr b="0" lang="en-US" sz="4400" spc="-1" strike="noStrike">
-                <a:solidFill>
-                  <a:srgbClr val="000000"/>
-                </a:solidFill>
-                <a:latin typeface="Arial"/>
-              </a:rPr>
-              <a:t>A</a:t>
+              <a:t>Comparative LCIA</a:t>
             </a:r>
             <a:endParaRPr b="0" lang="en-US" sz="4400" spc="-1" strike="noStrike">
               <a:solidFill>
@@ -4947,8 +4430,8 @@
           <p:nvPr/>
         </p:nvGraphicFramePr>
         <p:xfrm>
-          <a:off x="2870280" y="1822680"/>
-          <a:ext cx="6676920" cy="3751920"/>
+          <a:off x="2869200" y="1822680"/>
+          <a:ext cx="6674760" cy="3751560"/>
         </p:xfrm>
         <a:graphic>
           <a:graphicData uri="http://schemas.openxmlformats.org/drawingml/2006/chart">
@@ -4998,8 +4481,8 @@
         </p:nvSpPr>
         <p:spPr>
           <a:xfrm>
-            <a:off x="609480" y="273240"/>
-            <a:ext cx="10972080" cy="1144440"/>
+            <a:off x="609120" y="273240"/>
+            <a:ext cx="10968840" cy="1144080"/>
           </a:xfrm>
           <a:prstGeom prst="rect">
             <a:avLst/>
@@ -5030,34 +4513,7 @@
                 </a:solidFill>
                 <a:latin typeface="Arial"/>
               </a:rPr>
-              <a:t>Co</a:t>
-            </a:r>
-            <a:r>
-              <a:rPr b="0" lang="en-US" sz="4400" spc="-1" strike="noStrike">
-                <a:solidFill>
-                  <a:srgbClr val="000000"/>
-                </a:solidFill>
-                <a:latin typeface="Arial"/>
-              </a:rPr>
-              <a:t>ncl</a:t>
-            </a:r>
-            <a:r>
-              <a:rPr b="0" lang="en-US" sz="4400" spc="-1" strike="noStrike">
-                <a:solidFill>
-                  <a:srgbClr val="000000"/>
-                </a:solidFill>
-                <a:latin typeface="Arial"/>
-              </a:rPr>
-              <a:t>usi</a:t>
-            </a:r>
-            <a:r>
-              <a:rPr b="0" lang="en-US" sz="4400" spc="-1" strike="noStrike">
-                <a:solidFill>
-                  <a:srgbClr val="000000"/>
-                </a:solidFill>
-                <a:latin typeface="Arial"/>
-              </a:rPr>
-              <a:t>on</a:t>
+              <a:t>Conclusion</a:t>
             </a:r>
             <a:endParaRPr b="0" lang="en-US" sz="4400" spc="-1" strike="noStrike">
               <a:solidFill>
@@ -5080,8 +4536,8 @@
         </p:nvSpPr>
         <p:spPr>
           <a:xfrm>
-            <a:off x="609480" y="1604520"/>
-            <a:ext cx="10972080" cy="4407120"/>
+            <a:off x="609120" y="1604520"/>
+            <a:ext cx="10968840" cy="4406760"/>
           </a:xfrm>
           <a:prstGeom prst="rect">
             <a:avLst/>
@@ -5168,8 +4624,8 @@
         </p:nvSpPr>
         <p:spPr>
           <a:xfrm>
-            <a:off x="609480" y="273600"/>
-            <a:ext cx="10972080" cy="1144440"/>
+            <a:off x="609120" y="273600"/>
+            <a:ext cx="10968840" cy="1144080"/>
           </a:xfrm>
           <a:prstGeom prst="rect">
             <a:avLst/>
@@ -5200,34 +4656,7 @@
                 </a:solidFill>
                 <a:latin typeface="Arial"/>
               </a:rPr>
-              <a:t>Bibl</a:t>
-            </a:r>
-            <a:r>
-              <a:rPr b="0" lang="en-US" sz="4400" spc="-1" strike="noStrike">
-                <a:solidFill>
-                  <a:srgbClr val="000000"/>
-                </a:solidFill>
-                <a:latin typeface="Arial"/>
-              </a:rPr>
-              <a:t>iogr</a:t>
-            </a:r>
-            <a:r>
-              <a:rPr b="0" lang="en-US" sz="4400" spc="-1" strike="noStrike">
-                <a:solidFill>
-                  <a:srgbClr val="000000"/>
-                </a:solidFill>
-                <a:latin typeface="Arial"/>
-              </a:rPr>
-              <a:t>aph</a:t>
-            </a:r>
-            <a:r>
-              <a:rPr b="0" lang="en-US" sz="4400" spc="-1" strike="noStrike">
-                <a:solidFill>
-                  <a:srgbClr val="000000"/>
-                </a:solidFill>
-                <a:latin typeface="Arial"/>
-              </a:rPr>
-              <a:t>y</a:t>
+              <a:t>Bibliography</a:t>
             </a:r>
             <a:endParaRPr b="0" lang="en-US" sz="4400" spc="-1" strike="noStrike">
               <a:solidFill>
@@ -5250,8 +4679,8 @@
         </p:nvSpPr>
         <p:spPr>
           <a:xfrm>
-            <a:off x="609480" y="1604520"/>
-            <a:ext cx="10972080" cy="3976920"/>
+            <a:off x="609120" y="1604520"/>
+            <a:ext cx="10968840" cy="3976560"/>
           </a:xfrm>
           <a:prstGeom prst="rect">
             <a:avLst/>
@@ -5387,8 +4816,8 @@
         </p:nvSpPr>
         <p:spPr>
           <a:xfrm>
-            <a:off x="363960" y="829440"/>
-            <a:ext cx="11248560" cy="4700160"/>
+            <a:off x="363600" y="829440"/>
+            <a:ext cx="11245320" cy="4699800"/>
           </a:xfrm>
           <a:prstGeom prst="rect">
             <a:avLst/>
@@ -5419,106 +4848,7 @@
                 </a:solidFill>
                 <a:latin typeface="Arial"/>
               </a:rPr>
-              <a:t>Th</a:t>
-            </a:r>
-            <a:r>
-              <a:rPr b="0" lang="en-US" sz="5600" spc="-1" strike="noStrike">
-                <a:solidFill>
-                  <a:srgbClr val="000000"/>
-                </a:solidFill>
-                <a:latin typeface="Arial"/>
-              </a:rPr>
-              <a:t>an</a:t>
-            </a:r>
-            <a:r>
-              <a:rPr b="0" lang="en-US" sz="5600" spc="-1" strike="noStrike">
-                <a:solidFill>
-                  <a:srgbClr val="000000"/>
-                </a:solidFill>
-                <a:latin typeface="Arial"/>
-              </a:rPr>
-              <a:t>k </a:t>
-            </a:r>
-            <a:r>
-              <a:rPr b="0" lang="en-US" sz="5600" spc="-1" strike="noStrike">
-                <a:solidFill>
-                  <a:srgbClr val="000000"/>
-                </a:solidFill>
-                <a:latin typeface="Arial"/>
-              </a:rPr>
-              <a:t>yo</a:t>
-            </a:r>
-            <a:r>
-              <a:rPr b="0" lang="en-US" sz="5600" spc="-1" strike="noStrike">
-                <a:solidFill>
-                  <a:srgbClr val="000000"/>
-                </a:solidFill>
-                <a:latin typeface="Arial"/>
-              </a:rPr>
-              <a:t>u </a:t>
-            </a:r>
-            <a:r>
-              <a:rPr b="0" lang="en-US" sz="5600" spc="-1" strike="noStrike">
-                <a:solidFill>
-                  <a:srgbClr val="000000"/>
-                </a:solidFill>
-                <a:latin typeface="Arial"/>
-              </a:rPr>
-              <a:t>for </a:t>
-            </a:r>
-            <a:r>
-              <a:rPr b="0" lang="en-US" sz="5600" spc="-1" strike="noStrike">
-                <a:solidFill>
-                  <a:srgbClr val="000000"/>
-                </a:solidFill>
-                <a:latin typeface="Arial"/>
-              </a:rPr>
-              <a:t>yo</a:t>
-            </a:r>
-            <a:r>
-              <a:rPr b="0" lang="en-US" sz="5600" spc="-1" strike="noStrike">
-                <a:solidFill>
-                  <a:srgbClr val="000000"/>
-                </a:solidFill>
-                <a:latin typeface="Arial"/>
-              </a:rPr>
-              <a:t>ur </a:t>
-            </a:r>
-            <a:r>
-              <a:rPr b="0" lang="en-US" sz="5600" spc="-1" strike="noStrike">
-                <a:solidFill>
-                  <a:srgbClr val="000000"/>
-                </a:solidFill>
-                <a:latin typeface="Arial"/>
-              </a:rPr>
-              <a:t>att</a:t>
-            </a:r>
-            <a:r>
-              <a:rPr b="0" lang="en-US" sz="5600" spc="-1" strike="noStrike">
-                <a:solidFill>
-                  <a:srgbClr val="000000"/>
-                </a:solidFill>
-                <a:latin typeface="Arial"/>
-              </a:rPr>
-              <a:t>en</a:t>
-            </a:r>
-            <a:r>
-              <a:rPr b="0" lang="en-US" sz="5600" spc="-1" strike="noStrike">
-                <a:solidFill>
-                  <a:srgbClr val="000000"/>
-                </a:solidFill>
-                <a:latin typeface="Arial"/>
-              </a:rPr>
-              <a:t>tio</a:t>
-            </a:r>
-            <a:r>
-              <a:rPr b="0" lang="en-US" sz="5600" spc="-1" strike="noStrike">
-                <a:solidFill>
-                  <a:srgbClr val="000000"/>
-                </a:solidFill>
-                <a:latin typeface="Arial"/>
-              </a:rPr>
-              <a:t>n</a:t>
+              <a:t>Thank you for your attention</a:t>
             </a:r>
             <a:endParaRPr b="0" lang="en-US" sz="5600" spc="-1" strike="noStrike">
               <a:solidFill>
@@ -5545,6 +4875,13 @@
 <file path=ppt/slides/slide2.xml><?xml version="1.0" encoding="utf-8"?>
 <p:sld xmlns:a="http://schemas.openxmlformats.org/drawingml/2006/main" xmlns:p="http://schemas.openxmlformats.org/presentationml/2006/main" xmlns:r="http://schemas.openxmlformats.org/officeDocument/2006/relationships" xmlns:p14="http://schemas.microsoft.com/office/powerpoint/2010/main" xmlns:p15="http://schemas.microsoft.com/office/powerpoint/2012/main" xmlns:mc="http://schemas.openxmlformats.org/markup-compatibility/2006">
   <p:cSld>
+    <p:bg>
+      <p:bgPr>
+        <a:solidFill>
+          <a:srgbClr val="ffffff"/>
+        </a:solidFill>
+      </p:bgPr>
+    </p:bg>
     <p:spTree>
       <p:nvGrpSpPr>
         <p:cNvPr id="1" name=""/>
@@ -5571,8 +4908,8 @@
         </p:nvSpPr>
         <p:spPr>
           <a:xfrm>
-            <a:off x="258120" y="-429120"/>
-            <a:ext cx="11609640" cy="1838160"/>
+            <a:off x="257760" y="-429120"/>
+            <a:ext cx="11606040" cy="1837800"/>
           </a:xfrm>
           <a:prstGeom prst="rect">
             <a:avLst/>
@@ -5603,88 +4940,7 @@
                 </a:solidFill>
                 <a:latin typeface="Calibri Light"/>
               </a:rPr>
-              <a:t>Life </a:t>
-            </a:r>
-            <a:r>
-              <a:rPr b="0" lang="en-US" sz="4000" spc="-1" strike="noStrike">
-                <a:solidFill>
-                  <a:schemeClr val="dk1"/>
-                </a:solidFill>
-                <a:latin typeface="Calibri Light"/>
-              </a:rPr>
-              <a:t>Cycle </a:t>
-            </a:r>
-            <a:r>
-              <a:rPr b="0" lang="en-US" sz="4000" spc="-1" strike="noStrike">
-                <a:solidFill>
-                  <a:schemeClr val="dk1"/>
-                </a:solidFill>
-                <a:latin typeface="Calibri Light"/>
-              </a:rPr>
-              <a:t>Invento</a:t>
-            </a:r>
-            <a:r>
-              <a:rPr b="0" lang="en-US" sz="4000" spc="-1" strike="noStrike">
-                <a:solidFill>
-                  <a:schemeClr val="dk1"/>
-                </a:solidFill>
-                <a:latin typeface="Calibri Light"/>
-              </a:rPr>
-              <a:t>ry </a:t>
-            </a:r>
-            <a:r>
-              <a:rPr b="0" lang="en-US" sz="4000" spc="-1" strike="noStrike">
-                <a:solidFill>
-                  <a:schemeClr val="dk1"/>
-                </a:solidFill>
-                <a:latin typeface="Calibri Light"/>
-              </a:rPr>
-              <a:t>of </a:t>
-            </a:r>
-            <a:r>
-              <a:rPr b="0" lang="en-US" sz="4000" spc="-1" strike="noStrike">
-                <a:solidFill>
-                  <a:schemeClr val="dk1"/>
-                </a:solidFill>
-                <a:latin typeface="Calibri Light"/>
-              </a:rPr>
-              <a:t>Cyclope</a:t>
-            </a:r>
-            <a:r>
-              <a:rPr b="0" lang="en-US" sz="4000" spc="-1" strike="noStrike">
-                <a:solidFill>
-                  <a:schemeClr val="dk1"/>
-                </a:solidFill>
-                <a:latin typeface="Calibri Light"/>
-              </a:rPr>
-              <a:t>ntanon</a:t>
-            </a:r>
-            <a:r>
-              <a:rPr b="0" lang="en-US" sz="4000" spc="-1" strike="noStrike">
-                <a:solidFill>
-                  <a:schemeClr val="dk1"/>
-                </a:solidFill>
-                <a:latin typeface="Calibri Light"/>
-              </a:rPr>
-              <a:t>e </a:t>
-            </a:r>
-            <a:r>
-              <a:rPr b="0" lang="en-US" sz="4000" spc="-1" strike="noStrike">
-                <a:solidFill>
-                  <a:schemeClr val="dk1"/>
-                </a:solidFill>
-                <a:latin typeface="Calibri Light"/>
-              </a:rPr>
-              <a:t>Product</a:t>
-            </a:r>
-            <a:r>
-              <a:rPr b="0" lang="en-US" sz="4000" spc="-1" strike="noStrike">
-                <a:solidFill>
-                  <a:schemeClr val="dk1"/>
-                </a:solidFill>
-                <a:latin typeface="Calibri Light"/>
-              </a:rPr>
-              <a:t>ion </a:t>
+              <a:t>Life Cycle Inventory of Cyclopentanone Production </a:t>
             </a:r>
             <a:r>
               <a:rPr b="0" lang="en-US" sz="4000" spc="-1" strike="noStrike">
@@ -5702,16 +4958,7 @@
                 </a:solidFill>
                 <a:latin typeface="Calibri Light"/>
               </a:rPr>
-              <a:t>gate to </a:t>
-            </a:r>
-            <a:r>
-              <a:rPr b="0" lang="en-US" sz="4000" spc="-1" strike="noStrike">
-                <a:solidFill>
-                  <a:schemeClr val="dk1"/>
-                </a:solidFill>
-                <a:latin typeface="Calibri Light"/>
-              </a:rPr>
-              <a:t>gate)</a:t>
+              <a:t>gate to gate)</a:t>
             </a:r>
             <a:endParaRPr b="0" lang="en-US" sz="4000" spc="-1" strike="noStrike">
               <a:solidFill>
@@ -5729,18 +4976,18 @@
           <p:nvPr/>
         </p:nvGraphicFramePr>
         <p:xfrm>
-          <a:off x="317520" y="1679400"/>
-          <a:ext cx="9266040" cy="8420400"/>
+          <a:off x="317160" y="1679400"/>
+          <a:ext cx="5373000" cy="4876560"/>
         </p:xfrm>
         <a:graphic>
           <a:graphicData uri="http://schemas.openxmlformats.org/drawingml/2006/table">
             <a:tbl>
               <a:tblPr/>
               <a:tblGrid>
-                <a:gridCol w="2012760"/>
-                <a:gridCol w="1250640"/>
+                <a:gridCol w="2012400"/>
+                <a:gridCol w="1250280"/>
                 <a:gridCol w="1000800"/>
-                <a:gridCol w="1110600"/>
+                <a:gridCol w="1109520"/>
               </a:tblGrid>
               <a:tr h="266040">
                 <a:tc>
@@ -5770,7 +5017,7 @@
                         <a:solidFill>
                           <a:srgbClr val="000000"/>
                         </a:solidFill>
-                        <a:latin typeface="Times New Roman"/>
+                        <a:latin typeface="Arial"/>
                       </a:endParaRPr>
                     </a:p>
                   </a:txBody>
@@ -5831,7 +5078,7 @@
                         <a:solidFill>
                           <a:srgbClr val="000000"/>
                         </a:solidFill>
-                        <a:latin typeface="Times New Roman"/>
+                        <a:latin typeface="Arial"/>
                       </a:endParaRPr>
                     </a:p>
                   </a:txBody>
@@ -5892,7 +5139,7 @@
                         <a:solidFill>
                           <a:srgbClr val="000000"/>
                         </a:solidFill>
-                        <a:latin typeface="Times New Roman"/>
+                        <a:latin typeface="Arial"/>
                       </a:endParaRPr>
                     </a:p>
                   </a:txBody>
@@ -5953,7 +5200,7 @@
                         <a:solidFill>
                           <a:srgbClr val="000000"/>
                         </a:solidFill>
-                        <a:latin typeface="Times New Roman"/>
+                        <a:latin typeface="Arial"/>
                       </a:endParaRPr>
                     </a:p>
                   </a:txBody>
@@ -10060,18 +9307,18 @@
           <p:nvPr/>
         </p:nvGraphicFramePr>
         <p:xfrm>
-          <a:off x="6161040" y="1959840"/>
-          <a:ext cx="9266040" cy="8420400"/>
+          <a:off x="6159240" y="1959840"/>
+          <a:ext cx="5373000" cy="2600280"/>
         </p:xfrm>
         <a:graphic>
           <a:graphicData uri="http://schemas.openxmlformats.org/drawingml/2006/table">
             <a:tbl>
               <a:tblPr/>
               <a:tblGrid>
-                <a:gridCol w="2012760"/>
-                <a:gridCol w="1250640"/>
+                <a:gridCol w="2012400"/>
+                <a:gridCol w="1250280"/>
                 <a:gridCol w="1000800"/>
-                <a:gridCol w="1110600"/>
+                <a:gridCol w="1109520"/>
               </a:tblGrid>
               <a:tr h="266040">
                 <a:tc rowSpan="3">
@@ -10101,7 +9348,7 @@
                         <a:solidFill>
                           <a:srgbClr val="000000"/>
                         </a:solidFill>
-                        <a:latin typeface="Times New Roman"/>
+                        <a:latin typeface="Arial"/>
                       </a:endParaRPr>
                     </a:p>
                     <a:p>
@@ -10126,7 +9373,7 @@
                         <a:solidFill>
                           <a:srgbClr val="000000"/>
                         </a:solidFill>
-                        <a:latin typeface="Times New Roman"/>
+                        <a:latin typeface="Arial"/>
                       </a:endParaRPr>
                     </a:p>
                   </a:txBody>
@@ -10187,7 +9434,7 @@
                         <a:solidFill>
                           <a:srgbClr val="000000"/>
                         </a:solidFill>
-                        <a:latin typeface="Times New Roman"/>
+                        <a:latin typeface="Arial"/>
                       </a:endParaRPr>
                     </a:p>
                   </a:txBody>
@@ -10250,7 +9497,7 @@
                         <a:solidFill>
                           <a:srgbClr val="000000"/>
                         </a:solidFill>
-                        <a:latin typeface="Times New Roman"/>
+                        <a:latin typeface="Arial"/>
                       </a:endParaRPr>
                     </a:p>
                   </a:txBody>
@@ -10313,7 +9560,7 @@
                         <a:solidFill>
                           <a:srgbClr val="000000"/>
                         </a:solidFill>
-                        <a:latin typeface="Times New Roman"/>
+                        <a:latin typeface="Arial"/>
                       </a:endParaRPr>
                     </a:p>
                   </a:txBody>
@@ -10404,22 +9651,13 @@
                           </a:solidFill>
                           <a:latin typeface="Calibri"/>
                         </a:rPr>
-                        <a:t>Cyclopentanon</a:t>
-                      </a:r>
-                      <a:r>
-                        <a:rPr b="0" lang="en-US" sz="1100" spc="-1" strike="noStrike">
-                          <a:solidFill>
-                            <a:schemeClr val="dk1"/>
-                          </a:solidFill>
-                          <a:latin typeface="Calibri"/>
-                        </a:rPr>
-                        <a:t>e</a:t>
+                        <a:t>Cyclopentanone</a:t>
                       </a:r>
                       <a:endParaRPr b="0" lang="en-US" sz="1100" spc="-1" strike="noStrike">
                         <a:solidFill>
                           <a:srgbClr val="000000"/>
                         </a:solidFill>
-                        <a:latin typeface="Times New Roman"/>
+                        <a:latin typeface="Arial"/>
                       </a:endParaRPr>
                     </a:p>
                   </a:txBody>
@@ -10482,7 +9720,7 @@
                         <a:solidFill>
                           <a:srgbClr val="000000"/>
                         </a:solidFill>
-                        <a:latin typeface="Times New Roman"/>
+                        <a:latin typeface="Arial"/>
                       </a:endParaRPr>
                     </a:p>
                   </a:txBody>
@@ -10545,7 +9783,7 @@
                         <a:solidFill>
                           <a:srgbClr val="000000"/>
                         </a:solidFill>
-                        <a:latin typeface="Times New Roman"/>
+                        <a:latin typeface="Arial"/>
                       </a:endParaRPr>
                     </a:p>
                   </a:txBody>
@@ -10642,7 +9880,7 @@
                         <a:solidFill>
                           <a:srgbClr val="000000"/>
                         </a:solidFill>
-                        <a:latin typeface="Times New Roman"/>
+                        <a:latin typeface="Arial"/>
                       </a:endParaRPr>
                     </a:p>
                   </a:txBody>
@@ -10705,7 +9943,7 @@
                         <a:solidFill>
                           <a:srgbClr val="000000"/>
                         </a:solidFill>
-                        <a:latin typeface="Times New Roman"/>
+                        <a:latin typeface="Arial"/>
                       </a:endParaRPr>
                     </a:p>
                   </a:txBody>
@@ -10768,7 +10006,7 @@
                         <a:solidFill>
                           <a:srgbClr val="000000"/>
                         </a:solidFill>
-                        <a:latin typeface="Times New Roman"/>
+                        <a:latin typeface="Arial"/>
                       </a:endParaRPr>
                     </a:p>
                   </a:txBody>
@@ -10833,7 +10071,7 @@
                         <a:solidFill>
                           <a:srgbClr val="000000"/>
                         </a:solidFill>
-                        <a:latin typeface="Times New Roman"/>
+                        <a:latin typeface="Arial"/>
                       </a:endParaRPr>
                     </a:p>
                     <a:p>
@@ -10858,7 +10096,7 @@
                         <a:solidFill>
                           <a:srgbClr val="000000"/>
                         </a:solidFill>
-                        <a:latin typeface="Times New Roman"/>
+                        <a:latin typeface="Arial"/>
                       </a:endParaRPr>
                     </a:p>
                     <a:p>
@@ -10883,7 +10121,7 @@
                         <a:solidFill>
                           <a:srgbClr val="000000"/>
                         </a:solidFill>
-                        <a:latin typeface="Times New Roman"/>
+                        <a:latin typeface="Arial"/>
                       </a:endParaRPr>
                     </a:p>
                   </a:txBody>
@@ -10947,16 +10185,7 @@
                           </a:solidFill>
                           <a:latin typeface="Calibri"/>
                         </a:rPr>
-                        <a:t> </a:t>
-                      </a:r>
-                      <a:r>
-                        <a:rPr b="0" lang="el-GR" sz="1100" spc="-1" strike="noStrike">
-                          <a:solidFill>
-                            <a:schemeClr val="dk1"/>
-                          </a:solidFill>
-                          <a:latin typeface="Calibri"/>
-                        </a:rPr>
-                        <a:t>(</a:t>
+                        <a:t> (</a:t>
                       </a:r>
                       <a:r>
                         <a:rPr b="0" lang="en-US" sz="1100" spc="-1" strike="noStrike">
@@ -10971,7 +10200,7 @@
                         <a:solidFill>
                           <a:srgbClr val="000000"/>
                         </a:solidFill>
-                        <a:latin typeface="Times New Roman"/>
+                        <a:latin typeface="Arial"/>
                       </a:endParaRPr>
                     </a:p>
                   </a:txBody>
@@ -11034,7 +10263,7 @@
                         <a:solidFill>
                           <a:srgbClr val="000000"/>
                         </a:solidFill>
-                        <a:latin typeface="Times New Roman"/>
+                        <a:latin typeface="Arial"/>
                       </a:endParaRPr>
                     </a:p>
                   </a:txBody>
@@ -11097,7 +10326,7 @@
                         <a:solidFill>
                           <a:srgbClr val="000000"/>
                         </a:solidFill>
-                        <a:latin typeface="Times New Roman"/>
+                        <a:latin typeface="Arial"/>
                       </a:endParaRPr>
                     </a:p>
                   </a:txBody>
@@ -11188,22 +10417,13 @@
                           </a:solidFill>
                           <a:latin typeface="Calibri"/>
                         </a:rPr>
-                        <a:t>Cyclopentanon</a:t>
-                      </a:r>
-                      <a:r>
-                        <a:rPr b="0" lang="en-US" sz="1100" spc="-1" strike="noStrike">
-                          <a:solidFill>
-                            <a:schemeClr val="dk1"/>
-                          </a:solidFill>
-                          <a:latin typeface="Calibri"/>
-                        </a:rPr>
-                        <a:t>e</a:t>
+                        <a:t>Cyclopentanone</a:t>
                       </a:r>
                       <a:endParaRPr b="0" lang="en-US" sz="1100" spc="-1" strike="noStrike">
                         <a:solidFill>
                           <a:srgbClr val="000000"/>
                         </a:solidFill>
-                        <a:latin typeface="Times New Roman"/>
+                        <a:latin typeface="Arial"/>
                       </a:endParaRPr>
                     </a:p>
                   </a:txBody>
@@ -11266,7 +10486,7 @@
                         <a:solidFill>
                           <a:srgbClr val="000000"/>
                         </a:solidFill>
-                        <a:latin typeface="Times New Roman"/>
+                        <a:latin typeface="Arial"/>
                       </a:endParaRPr>
                     </a:p>
                   </a:txBody>
@@ -11329,7 +10549,7 @@
                         <a:solidFill>
                           <a:srgbClr val="000000"/>
                         </a:solidFill>
-                        <a:latin typeface="Times New Roman"/>
+                        <a:latin typeface="Arial"/>
                       </a:endParaRPr>
                     </a:p>
                   </a:txBody>
@@ -11444,7 +10664,7 @@
                         <a:solidFill>
                           <a:srgbClr val="000000"/>
                         </a:solidFill>
-                        <a:latin typeface="Times New Roman"/>
+                        <a:latin typeface="Arial"/>
                       </a:endParaRPr>
                     </a:p>
                   </a:txBody>
@@ -11507,7 +10727,7 @@
                         <a:solidFill>
                           <a:srgbClr val="000000"/>
                         </a:solidFill>
-                        <a:latin typeface="Times New Roman"/>
+                        <a:latin typeface="Arial"/>
                       </a:endParaRPr>
                     </a:p>
                   </a:txBody>
@@ -11570,7 +10790,7 @@
                         <a:solidFill>
                           <a:srgbClr val="000000"/>
                         </a:solidFill>
-                        <a:latin typeface="Times New Roman"/>
+                        <a:latin typeface="Arial"/>
                       </a:endParaRPr>
                     </a:p>
                   </a:txBody>
@@ -11667,7 +10887,7 @@
                         <a:solidFill>
                           <a:srgbClr val="000000"/>
                         </a:solidFill>
-                        <a:latin typeface="Times New Roman"/>
+                        <a:latin typeface="Arial"/>
                       </a:endParaRPr>
                     </a:p>
                   </a:txBody>
@@ -11730,7 +10950,7 @@
                         <a:solidFill>
                           <a:srgbClr val="000000"/>
                         </a:solidFill>
-                        <a:latin typeface="Times New Roman"/>
+                        <a:latin typeface="Arial"/>
                       </a:endParaRPr>
                     </a:p>
                   </a:txBody>
@@ -11793,7 +11013,7 @@
                         <a:solidFill>
                           <a:srgbClr val="000000"/>
                         </a:solidFill>
-                        <a:latin typeface="Times New Roman"/>
+                        <a:latin typeface="Arial"/>
                       </a:endParaRPr>
                     </a:p>
                   </a:txBody>
@@ -11884,22 +11104,13 @@
                           </a:solidFill>
                           <a:latin typeface="Calibri"/>
                         </a:rPr>
-                        <a:t>Furfural (co-</a:t>
-                      </a:r>
-                      <a:r>
-                        <a:rPr b="0" lang="en-US" sz="1100" spc="-1" strike="noStrike">
-                          <a:solidFill>
-                            <a:schemeClr val="dk1"/>
-                          </a:solidFill>
-                          <a:latin typeface="Calibri"/>
-                        </a:rPr>
-                        <a:t>prod)</a:t>
+                        <a:t>Furfural (co-prod)</a:t>
                       </a:r>
                       <a:endParaRPr b="0" lang="en-US" sz="1100" spc="-1" strike="noStrike">
                         <a:solidFill>
                           <a:srgbClr val="000000"/>
                         </a:solidFill>
-                        <a:latin typeface="Times New Roman"/>
+                        <a:latin typeface="Arial"/>
                       </a:endParaRPr>
                     </a:p>
                   </a:txBody>
@@ -11962,7 +11173,7 @@
                         <a:solidFill>
                           <a:srgbClr val="000000"/>
                         </a:solidFill>
-                        <a:latin typeface="Times New Roman"/>
+                        <a:latin typeface="Arial"/>
                       </a:endParaRPr>
                     </a:p>
                   </a:txBody>
@@ -12025,7 +11236,7 @@
                         <a:solidFill>
                           <a:srgbClr val="000000"/>
                         </a:solidFill>
-                        <a:latin typeface="Times New Roman"/>
+                        <a:latin typeface="Arial"/>
                       </a:endParaRPr>
                     </a:p>
                   </a:txBody>
@@ -12073,20 +11284,20 @@
           <p:nvPr/>
         </p:nvGraphicFramePr>
         <p:xfrm>
-          <a:off x="6146640" y="1710000"/>
-          <a:ext cx="9266040" cy="8420400"/>
+          <a:off x="6144840" y="1710000"/>
+          <a:ext cx="5373000" cy="266040"/>
         </p:xfrm>
         <a:graphic>
           <a:graphicData uri="http://schemas.openxmlformats.org/drawingml/2006/table">
             <a:tbl>
               <a:tblPr/>
               <a:tblGrid>
-                <a:gridCol w="2012760"/>
-                <a:gridCol w="1250640"/>
+                <a:gridCol w="2012400"/>
+                <a:gridCol w="1250280"/>
                 <a:gridCol w="1000800"/>
-                <a:gridCol w="1110600"/>
+                <a:gridCol w="1109520"/>
               </a:tblGrid>
-              <a:tr h="258120">
+              <a:tr h="413280">
                 <a:tc>
                   <a:txBody>
                     <a:bodyPr lIns="66600" rIns="66600" anchor="t">
@@ -12114,7 +11325,7 @@
                         <a:solidFill>
                           <a:srgbClr val="000000"/>
                         </a:solidFill>
-                        <a:latin typeface="Times New Roman"/>
+                        <a:latin typeface="Arial"/>
                       </a:endParaRPr>
                     </a:p>
                   </a:txBody>
@@ -12175,7 +11386,7 @@
                         <a:solidFill>
                           <a:srgbClr val="000000"/>
                         </a:solidFill>
-                        <a:latin typeface="Times New Roman"/>
+                        <a:latin typeface="Arial"/>
                       </a:endParaRPr>
                     </a:p>
                   </a:txBody>
@@ -12236,7 +11447,7 @@
                         <a:solidFill>
                           <a:srgbClr val="000000"/>
                         </a:solidFill>
-                        <a:latin typeface="Times New Roman"/>
+                        <a:latin typeface="Arial"/>
                       </a:endParaRPr>
                     </a:p>
                   </a:txBody>
@@ -12297,7 +11508,7 @@
                         <a:solidFill>
                           <a:srgbClr val="000000"/>
                         </a:solidFill>
-                        <a:latin typeface="Times New Roman"/>
+                        <a:latin typeface="Arial"/>
                       </a:endParaRPr>
                     </a:p>
                   </a:txBody>
@@ -12378,8 +11589,8 @@
         </p:nvSpPr>
         <p:spPr>
           <a:xfrm>
-            <a:off x="884880" y="-48600"/>
-            <a:ext cx="10514880" cy="1324800"/>
+            <a:off x="884520" y="-48600"/>
+            <a:ext cx="10511640" cy="1324440"/>
           </a:xfrm>
           <a:prstGeom prst="rect">
             <a:avLst/>
@@ -12410,97 +11621,7 @@
                 </a:solidFill>
                 <a:latin typeface="Calibri Light"/>
               </a:rPr>
-              <a:t>Cyc</a:t>
-            </a:r>
-            <a:r>
-              <a:rPr b="0" lang="en-US" sz="4400" spc="-1" strike="noStrike">
-                <a:solidFill>
-                  <a:schemeClr val="dk1"/>
-                </a:solidFill>
-                <a:latin typeface="Calibri Light"/>
-              </a:rPr>
-              <a:t>lop</a:t>
-            </a:r>
-            <a:r>
-              <a:rPr b="0" lang="en-US" sz="4400" spc="-1" strike="noStrike">
-                <a:solidFill>
-                  <a:schemeClr val="dk1"/>
-                </a:solidFill>
-                <a:latin typeface="Calibri Light"/>
-              </a:rPr>
-              <a:t>ent</a:t>
-            </a:r>
-            <a:r>
-              <a:rPr b="0" lang="en-US" sz="4400" spc="-1" strike="noStrike">
-                <a:solidFill>
-                  <a:schemeClr val="dk1"/>
-                </a:solidFill>
-                <a:latin typeface="Calibri Light"/>
-              </a:rPr>
-              <a:t>ano</a:t>
-            </a:r>
-            <a:r>
-              <a:rPr b="0" lang="en-US" sz="4400" spc="-1" strike="noStrike">
-                <a:solidFill>
-                  <a:schemeClr val="dk1"/>
-                </a:solidFill>
-                <a:latin typeface="Calibri Light"/>
-              </a:rPr>
-              <a:t>ne </a:t>
-            </a:r>
-            <a:r>
-              <a:rPr b="0" lang="en-US" sz="4400" spc="-1" strike="noStrike">
-                <a:solidFill>
-                  <a:schemeClr val="dk1"/>
-                </a:solidFill>
-                <a:latin typeface="Calibri Light"/>
-              </a:rPr>
-              <a:t>Pro</a:t>
-            </a:r>
-            <a:r>
-              <a:rPr b="0" lang="en-US" sz="4400" spc="-1" strike="noStrike">
-                <a:solidFill>
-                  <a:schemeClr val="dk1"/>
-                </a:solidFill>
-                <a:latin typeface="Calibri Light"/>
-              </a:rPr>
-              <a:t>duc</a:t>
-            </a:r>
-            <a:r>
-              <a:rPr b="0" lang="en-US" sz="4400" spc="-1" strike="noStrike">
-                <a:solidFill>
-                  <a:schemeClr val="dk1"/>
-                </a:solidFill>
-                <a:latin typeface="Calibri Light"/>
-              </a:rPr>
-              <a:t>tio</a:t>
-            </a:r>
-            <a:r>
-              <a:rPr b="0" lang="en-US" sz="4400" spc="-1" strike="noStrike">
-                <a:solidFill>
-                  <a:schemeClr val="dk1"/>
-                </a:solidFill>
-                <a:latin typeface="Calibri Light"/>
-              </a:rPr>
-              <a:t>n in </a:t>
-            </a:r>
-            <a:r>
-              <a:rPr b="0" lang="en-US" sz="4400" spc="-1" strike="noStrike">
-                <a:solidFill>
-                  <a:schemeClr val="dk1"/>
-                </a:solidFill>
-                <a:latin typeface="Calibri Light"/>
-              </a:rPr>
-              <a:t>CCa</a:t>
-            </a:r>
-            <a:r>
-              <a:rPr b="0" lang="en-US" sz="4400" spc="-1" strike="noStrike">
-                <a:solidFill>
-                  <a:schemeClr val="dk1"/>
-                </a:solidFill>
-                <a:latin typeface="Calibri Light"/>
-              </a:rPr>
-              <a:t>LC</a:t>
+              <a:t>Cyclopentanone Production in CCaLC</a:t>
             </a:r>
             <a:endParaRPr b="0" lang="en-US" sz="4400" spc="-1" strike="noStrike">
               <a:solidFill>
@@ -12524,8 +11645,8 @@
         </p:blipFill>
         <p:spPr>
           <a:xfrm>
-            <a:off x="1758600" y="1198440"/>
-            <a:ext cx="8974440" cy="5166720"/>
+            <a:off x="1757880" y="1198440"/>
+            <a:ext cx="8971560" cy="5166360"/>
           </a:xfrm>
           <a:prstGeom prst="rect">
             <a:avLst/>
@@ -12577,8 +11698,8 @@
         </p:nvSpPr>
         <p:spPr>
           <a:xfrm>
-            <a:off x="838080" y="169920"/>
-            <a:ext cx="10514880" cy="1324800"/>
+            <a:off x="837720" y="169920"/>
+            <a:ext cx="10511640" cy="1324440"/>
           </a:xfrm>
           <a:prstGeom prst="rect">
             <a:avLst/>
@@ -12609,187 +11730,7 @@
                 </a:solidFill>
                 <a:latin typeface="Calibri Light"/>
               </a:rPr>
-              <a:t>Ass</a:t>
-            </a:r>
-            <a:r>
-              <a:rPr b="0" lang="en-US" sz="4400" spc="-1" strike="noStrike">
-                <a:solidFill>
-                  <a:schemeClr val="dk1"/>
-                </a:solidFill>
-                <a:latin typeface="Calibri Light"/>
-              </a:rPr>
-              <a:t>um</a:t>
-            </a:r>
-            <a:r>
-              <a:rPr b="0" lang="en-US" sz="4400" spc="-1" strike="noStrike">
-                <a:solidFill>
-                  <a:schemeClr val="dk1"/>
-                </a:solidFill>
-                <a:latin typeface="Calibri Light"/>
-              </a:rPr>
-              <a:t>pti</a:t>
-            </a:r>
-            <a:r>
-              <a:rPr b="0" lang="en-US" sz="4400" spc="-1" strike="noStrike">
-                <a:solidFill>
-                  <a:schemeClr val="dk1"/>
-                </a:solidFill>
-                <a:latin typeface="Calibri Light"/>
-              </a:rPr>
-              <a:t>ons </a:t>
-            </a:r>
-            <a:r>
-              <a:rPr b="0" lang="en-US" sz="4400" spc="-1" strike="noStrike">
-                <a:solidFill>
-                  <a:schemeClr val="dk1"/>
-                </a:solidFill>
-                <a:latin typeface="Calibri Light"/>
-              </a:rPr>
-              <a:t>for </a:t>
-            </a:r>
-            <a:r>
-              <a:rPr b="0" lang="en-US" sz="4400" spc="-1" strike="noStrike">
-                <a:solidFill>
-                  <a:schemeClr val="dk1"/>
-                </a:solidFill>
-                <a:latin typeface="Calibri Light"/>
-              </a:rPr>
-              <a:t>Cyc</a:t>
-            </a:r>
-            <a:r>
-              <a:rPr b="0" lang="en-US" sz="4400" spc="-1" strike="noStrike">
-                <a:solidFill>
-                  <a:schemeClr val="dk1"/>
-                </a:solidFill>
-                <a:latin typeface="Calibri Light"/>
-              </a:rPr>
-              <a:t>lop</a:t>
-            </a:r>
-            <a:r>
-              <a:rPr b="0" lang="en-US" sz="4400" spc="-1" strike="noStrike">
-                <a:solidFill>
-                  <a:schemeClr val="dk1"/>
-                </a:solidFill>
-                <a:latin typeface="Calibri Light"/>
-              </a:rPr>
-              <a:t>ent</a:t>
-            </a:r>
-            <a:r>
-              <a:rPr b="0" lang="en-US" sz="4400" spc="-1" strike="noStrike">
-                <a:solidFill>
-                  <a:schemeClr val="dk1"/>
-                </a:solidFill>
-                <a:latin typeface="Calibri Light"/>
-              </a:rPr>
-              <a:t>ano</a:t>
-            </a:r>
-            <a:r>
-              <a:rPr b="0" lang="en-US" sz="4400" spc="-1" strike="noStrike">
-                <a:solidFill>
-                  <a:schemeClr val="dk1"/>
-                </a:solidFill>
-                <a:latin typeface="Calibri Light"/>
-              </a:rPr>
-              <a:t>ne </a:t>
-            </a:r>
-            <a:r>
-              <a:rPr b="0" lang="en-US" sz="4400" spc="-1" strike="noStrike">
-                <a:solidFill>
-                  <a:schemeClr val="dk1"/>
-                </a:solidFill>
-                <a:latin typeface="Calibri Light"/>
-              </a:rPr>
-              <a:t>Pro</a:t>
-            </a:r>
-            <a:r>
-              <a:rPr b="0" lang="en-US" sz="4400" spc="-1" strike="noStrike">
-                <a:solidFill>
-                  <a:schemeClr val="dk1"/>
-                </a:solidFill>
-                <a:latin typeface="Calibri Light"/>
-              </a:rPr>
-              <a:t>duc</a:t>
-            </a:r>
-            <a:r>
-              <a:rPr b="0" lang="en-US" sz="4400" spc="-1" strike="noStrike">
-                <a:solidFill>
-                  <a:schemeClr val="dk1"/>
-                </a:solidFill>
-                <a:latin typeface="Calibri Light"/>
-              </a:rPr>
-              <a:t>tio</a:t>
-            </a:r>
-            <a:r>
-              <a:rPr b="0" lang="en-US" sz="4400" spc="-1" strike="noStrike">
-                <a:solidFill>
-                  <a:schemeClr val="dk1"/>
-                </a:solidFill>
-                <a:latin typeface="Calibri Light"/>
-              </a:rPr>
-              <a:t>n </a:t>
-            </a:r>
-            <a:r>
-              <a:rPr b="0" lang="en-US" sz="4400" spc="-1" strike="noStrike">
-                <a:solidFill>
-                  <a:schemeClr val="dk1"/>
-                </a:solidFill>
-                <a:latin typeface="Calibri Light"/>
-              </a:rPr>
-              <a:t>fro</a:t>
-            </a:r>
-            <a:r>
-              <a:rPr b="0" lang="en-US" sz="4400" spc="-1" strike="noStrike">
-                <a:solidFill>
-                  <a:schemeClr val="dk1"/>
-                </a:solidFill>
-                <a:latin typeface="Calibri Light"/>
-              </a:rPr>
-              <a:t>m </a:t>
-            </a:r>
-            <a:r>
-              <a:rPr b="0" lang="en-US" sz="4400" spc="-1" strike="noStrike">
-                <a:solidFill>
-                  <a:schemeClr val="dk1"/>
-                </a:solidFill>
-                <a:latin typeface="Calibri Light"/>
-              </a:rPr>
-              <a:t>Oliv</a:t>
-            </a:r>
-            <a:r>
-              <a:rPr b="0" lang="en-US" sz="4400" spc="-1" strike="noStrike">
-                <a:solidFill>
-                  <a:schemeClr val="dk1"/>
-                </a:solidFill>
-                <a:latin typeface="Calibri Light"/>
-              </a:rPr>
-              <a:t>e </a:t>
-            </a:r>
-            <a:r>
-              <a:rPr b="0" lang="en-US" sz="4400" spc="-1" strike="noStrike">
-                <a:solidFill>
-                  <a:schemeClr val="dk1"/>
-                </a:solidFill>
-                <a:latin typeface="Calibri Light"/>
-              </a:rPr>
-              <a:t>Ker</a:t>
-            </a:r>
-            <a:r>
-              <a:rPr b="0" lang="en-US" sz="4400" spc="-1" strike="noStrike">
-                <a:solidFill>
-                  <a:schemeClr val="dk1"/>
-                </a:solidFill>
-                <a:latin typeface="Calibri Light"/>
-              </a:rPr>
-              <a:t>nel</a:t>
-            </a:r>
-            <a:r>
-              <a:rPr b="0" lang="en-US" sz="4400" spc="-1" strike="noStrike">
-                <a:solidFill>
-                  <a:schemeClr val="dk1"/>
-                </a:solidFill>
-                <a:latin typeface="Calibri Light"/>
-              </a:rPr>
-              <a:t>s</a:t>
+              <a:t>Assumptions for Cyclopentanone Production from Olive Kernels</a:t>
             </a:r>
             <a:endParaRPr b="0" lang="en-US" sz="4400" spc="-1" strike="noStrike">
               <a:solidFill>
@@ -12812,8 +11753,8 @@
         </p:nvSpPr>
         <p:spPr>
           <a:xfrm>
-            <a:off x="1291320" y="1974600"/>
-            <a:ext cx="10514880" cy="4350600"/>
+            <a:off x="1290960" y="1974600"/>
+            <a:ext cx="10511640" cy="4350240"/>
           </a:xfrm>
           <a:prstGeom prst="rect">
             <a:avLst/>
@@ -13106,7 +12047,7 @@
         <p:spPr>
           <a:xfrm>
             <a:off x="4586040" y="2968200"/>
-            <a:ext cx="1266840" cy="720"/>
+            <a:ext cx="1267200" cy="1080"/>
           </a:xfrm>
           <a:prstGeom prst="straightConnector1">
             <a:avLst/>
@@ -13161,8 +12102,8 @@
         </p:nvSpPr>
         <p:spPr>
           <a:xfrm>
-            <a:off x="609480" y="273600"/>
-            <a:ext cx="10972080" cy="1144440"/>
+            <a:off x="609120" y="273600"/>
+            <a:ext cx="10968840" cy="1144080"/>
           </a:xfrm>
           <a:prstGeom prst="rect">
             <a:avLst/>
@@ -13178,7 +12119,13 @@
           </a:bodyPr>
           <a:p>
             <a:pPr indent="0" algn="ctr">
+              <a:lnSpc>
+                <a:spcPct val="100000"/>
+              </a:lnSpc>
               <a:buNone/>
+              <a:tabLst>
+                <a:tab algn="l" pos="0"/>
+              </a:tabLst>
             </a:pPr>
             <a:r>
               <a:rPr b="0" lang="en-US" sz="4400" spc="-1" strike="noStrike">
@@ -13187,88 +12134,7 @@
                 </a:solidFill>
                 <a:latin typeface="Arial"/>
               </a:rPr>
-              <a:t>Car</a:t>
-            </a:r>
-            <a:r>
-              <a:rPr b="0" lang="en-US" sz="4400" spc="-1" strike="noStrike">
-                <a:solidFill>
-                  <a:srgbClr val="000000"/>
-                </a:solidFill>
-                <a:latin typeface="Arial"/>
-              </a:rPr>
-              <a:t>bon </a:t>
-            </a:r>
-            <a:r>
-              <a:rPr b="0" lang="en-US" sz="4400" spc="-1" strike="noStrike">
-                <a:solidFill>
-                  <a:srgbClr val="000000"/>
-                </a:solidFill>
-                <a:latin typeface="Arial"/>
-              </a:rPr>
-              <a:t>Foo</a:t>
-            </a:r>
-            <a:r>
-              <a:rPr b="0" lang="en-US" sz="4400" spc="-1" strike="noStrike">
-                <a:solidFill>
-                  <a:srgbClr val="000000"/>
-                </a:solidFill>
-                <a:latin typeface="Arial"/>
-              </a:rPr>
-              <a:t>tpri</a:t>
-            </a:r>
-            <a:r>
-              <a:rPr b="0" lang="en-US" sz="4400" spc="-1" strike="noStrike">
-                <a:solidFill>
-                  <a:srgbClr val="000000"/>
-                </a:solidFill>
-                <a:latin typeface="Arial"/>
-              </a:rPr>
-              <a:t>nt </a:t>
-            </a:r>
-            <a:r>
-              <a:rPr b="0" lang="en-US" sz="4400" spc="-1" strike="noStrike">
-                <a:solidFill>
-                  <a:srgbClr val="000000"/>
-                </a:solidFill>
-                <a:latin typeface="Arial"/>
-              </a:rPr>
-              <a:t>of </a:t>
-            </a:r>
-            <a:r>
-              <a:rPr b="0" lang="en-US" sz="4400" spc="-1" strike="noStrike">
-                <a:solidFill>
-                  <a:srgbClr val="000000"/>
-                </a:solidFill>
-                <a:latin typeface="Arial"/>
-              </a:rPr>
-              <a:t>the </a:t>
-            </a:r>
-            <a:r>
-              <a:rPr b="0" lang="en-US" sz="4400" spc="-1" strike="noStrike">
-                <a:solidFill>
-                  <a:srgbClr val="000000"/>
-                </a:solidFill>
-                <a:latin typeface="Arial"/>
-              </a:rPr>
-              <a:t>pro</a:t>
-            </a:r>
-            <a:r>
-              <a:rPr b="0" lang="en-US" sz="4400" spc="-1" strike="noStrike">
-                <a:solidFill>
-                  <a:srgbClr val="000000"/>
-                </a:solidFill>
-                <a:latin typeface="Arial"/>
-              </a:rPr>
-              <a:t>ces</a:t>
-            </a:r>
-            <a:r>
-              <a:rPr b="0" lang="en-US" sz="4400" spc="-1" strike="noStrike">
-                <a:solidFill>
-                  <a:srgbClr val="000000"/>
-                </a:solidFill>
-                <a:latin typeface="Arial"/>
-              </a:rPr>
-              <a:t>s I</a:t>
+              <a:t>Carbon Footprint of the process I</a:t>
             </a:r>
             <a:endParaRPr b="0" lang="en-US" sz="4400" spc="-1" strike="noStrike">
               <a:solidFill>
@@ -13291,8 +12157,8 @@
         </p:blipFill>
         <p:spPr>
           <a:xfrm>
-            <a:off x="2003760" y="1663200"/>
-            <a:ext cx="8444880" cy="4005000"/>
+            <a:off x="2003040" y="1663200"/>
+            <a:ext cx="8442360" cy="4004640"/>
           </a:xfrm>
           <a:prstGeom prst="rect">
             <a:avLst/>
@@ -13344,8 +12210,8 @@
         </p:nvSpPr>
         <p:spPr>
           <a:xfrm>
-            <a:off x="609480" y="273600"/>
-            <a:ext cx="10972080" cy="1144440"/>
+            <a:off x="609120" y="273600"/>
+            <a:ext cx="10968840" cy="1144080"/>
           </a:xfrm>
           <a:prstGeom prst="rect">
             <a:avLst/>
@@ -13361,7 +12227,13 @@
           </a:bodyPr>
           <a:p>
             <a:pPr indent="0" algn="ctr">
+              <a:lnSpc>
+                <a:spcPct val="100000"/>
+              </a:lnSpc>
               <a:buNone/>
+              <a:tabLst>
+                <a:tab algn="l" pos="0"/>
+              </a:tabLst>
             </a:pPr>
             <a:r>
               <a:rPr b="0" lang="en-US" sz="4400" spc="-1" strike="noStrike">
@@ -13370,88 +12242,7 @@
                 </a:solidFill>
                 <a:latin typeface="Arial"/>
               </a:rPr>
-              <a:t>Car</a:t>
-            </a:r>
-            <a:r>
-              <a:rPr b="0" lang="en-US" sz="4400" spc="-1" strike="noStrike">
-                <a:solidFill>
-                  <a:srgbClr val="000000"/>
-                </a:solidFill>
-                <a:latin typeface="Arial"/>
-              </a:rPr>
-              <a:t>bon </a:t>
-            </a:r>
-            <a:r>
-              <a:rPr b="0" lang="en-US" sz="4400" spc="-1" strike="noStrike">
-                <a:solidFill>
-                  <a:srgbClr val="000000"/>
-                </a:solidFill>
-                <a:latin typeface="Arial"/>
-              </a:rPr>
-              <a:t>Foo</a:t>
-            </a:r>
-            <a:r>
-              <a:rPr b="0" lang="en-US" sz="4400" spc="-1" strike="noStrike">
-                <a:solidFill>
-                  <a:srgbClr val="000000"/>
-                </a:solidFill>
-                <a:latin typeface="Arial"/>
-              </a:rPr>
-              <a:t>tpri</a:t>
-            </a:r>
-            <a:r>
-              <a:rPr b="0" lang="en-US" sz="4400" spc="-1" strike="noStrike">
-                <a:solidFill>
-                  <a:srgbClr val="000000"/>
-                </a:solidFill>
-                <a:latin typeface="Arial"/>
-              </a:rPr>
-              <a:t>nt </a:t>
-            </a:r>
-            <a:r>
-              <a:rPr b="0" lang="en-US" sz="4400" spc="-1" strike="noStrike">
-                <a:solidFill>
-                  <a:srgbClr val="000000"/>
-                </a:solidFill>
-                <a:latin typeface="Arial"/>
-              </a:rPr>
-              <a:t>of </a:t>
-            </a:r>
-            <a:r>
-              <a:rPr b="0" lang="en-US" sz="4400" spc="-1" strike="noStrike">
-                <a:solidFill>
-                  <a:srgbClr val="000000"/>
-                </a:solidFill>
-                <a:latin typeface="Arial"/>
-              </a:rPr>
-              <a:t>the </a:t>
-            </a:r>
-            <a:r>
-              <a:rPr b="0" lang="en-US" sz="4400" spc="-1" strike="noStrike">
-                <a:solidFill>
-                  <a:srgbClr val="000000"/>
-                </a:solidFill>
-                <a:latin typeface="Arial"/>
-              </a:rPr>
-              <a:t>pro</a:t>
-            </a:r>
-            <a:r>
-              <a:rPr b="0" lang="en-US" sz="4400" spc="-1" strike="noStrike">
-                <a:solidFill>
-                  <a:srgbClr val="000000"/>
-                </a:solidFill>
-                <a:latin typeface="Arial"/>
-              </a:rPr>
-              <a:t>ces</a:t>
-            </a:r>
-            <a:r>
-              <a:rPr b="0" lang="en-US" sz="4400" spc="-1" strike="noStrike">
-                <a:solidFill>
-                  <a:srgbClr val="000000"/>
-                </a:solidFill>
-                <a:latin typeface="Arial"/>
-              </a:rPr>
-              <a:t>s II</a:t>
+              <a:t>Carbon Footprint of the process II</a:t>
             </a:r>
             <a:endParaRPr b="0" lang="en-US" sz="4400" spc="-1" strike="noStrike">
               <a:solidFill>
@@ -13474,8 +12265,8 @@
         </p:blipFill>
         <p:spPr>
           <a:xfrm>
-            <a:off x="6603120" y="2045520"/>
-            <a:ext cx="5345280" cy="2772360"/>
+            <a:off x="6601320" y="2045520"/>
+            <a:ext cx="5343480" cy="2772000"/>
           </a:xfrm>
           <a:prstGeom prst="rect">
             <a:avLst/>
@@ -13497,8 +12288,8 @@
         </p:blipFill>
         <p:spPr>
           <a:xfrm>
-            <a:off x="362880" y="1559160"/>
-            <a:ext cx="5735880" cy="3273840"/>
+            <a:off x="362520" y="1559160"/>
+            <a:ext cx="5734080" cy="3273480"/>
           </a:xfrm>
           <a:prstGeom prst="rect">
             <a:avLst/>
@@ -13550,8 +12341,8 @@
         </p:nvSpPr>
         <p:spPr>
           <a:xfrm>
-            <a:off x="609480" y="-101520"/>
-            <a:ext cx="10972080" cy="1144440"/>
+            <a:off x="609120" y="-101520"/>
+            <a:ext cx="10968840" cy="1144080"/>
           </a:xfrm>
           <a:prstGeom prst="rect">
             <a:avLst/>
@@ -13567,7 +12358,13 @@
           </a:bodyPr>
           <a:p>
             <a:pPr indent="0" algn="ctr">
+              <a:lnSpc>
+                <a:spcPct val="100000"/>
+              </a:lnSpc>
               <a:buNone/>
+              <a:tabLst>
+                <a:tab algn="l" pos="0"/>
+              </a:tabLst>
             </a:pPr>
             <a:r>
               <a:rPr b="0" lang="en-US" sz="4400" spc="-1" strike="noStrike">
@@ -13576,43 +12373,7 @@
                 </a:solidFill>
                 <a:latin typeface="Arial"/>
               </a:rPr>
-              <a:t>Oth</a:t>
-            </a:r>
-            <a:r>
-              <a:rPr b="0" lang="en-US" sz="4400" spc="-1" strike="noStrike">
-                <a:solidFill>
-                  <a:srgbClr val="000000"/>
-                </a:solidFill>
-                <a:latin typeface="Arial"/>
-              </a:rPr>
-              <a:t>er </a:t>
-            </a:r>
-            <a:r>
-              <a:rPr b="0" lang="en-US" sz="4400" spc="-1" strike="noStrike">
-                <a:solidFill>
-                  <a:srgbClr val="000000"/>
-                </a:solidFill>
-                <a:latin typeface="Arial"/>
-              </a:rPr>
-              <a:t>Imp</a:t>
-            </a:r>
-            <a:r>
-              <a:rPr b="0" lang="en-US" sz="4400" spc="-1" strike="noStrike">
-                <a:solidFill>
-                  <a:srgbClr val="000000"/>
-                </a:solidFill>
-                <a:latin typeface="Arial"/>
-              </a:rPr>
-              <a:t>act</a:t>
-            </a:r>
-            <a:r>
-              <a:rPr b="0" lang="en-US" sz="4400" spc="-1" strike="noStrike">
-                <a:solidFill>
-                  <a:srgbClr val="000000"/>
-                </a:solidFill>
-                <a:latin typeface="Arial"/>
-              </a:rPr>
-              <a:t>s</a:t>
+              <a:t>Other Impacts</a:t>
             </a:r>
             <a:endParaRPr b="0" lang="en-US" sz="4400" spc="-1" strike="noStrike">
               <a:solidFill>
@@ -13635,8 +12396,8 @@
         </p:blipFill>
         <p:spPr>
           <a:xfrm>
-            <a:off x="406440" y="964800"/>
-            <a:ext cx="5341680" cy="2814120"/>
+            <a:off x="406080" y="964800"/>
+            <a:ext cx="5339880" cy="2813760"/>
           </a:xfrm>
           <a:prstGeom prst="rect">
             <a:avLst/>
@@ -13658,8 +12419,8 @@
         </p:blipFill>
         <p:spPr>
           <a:xfrm>
-            <a:off x="6227280" y="1042920"/>
-            <a:ext cx="5510880" cy="2774880"/>
+            <a:off x="6225480" y="1042920"/>
+            <a:ext cx="5509080" cy="2774520"/>
           </a:xfrm>
           <a:prstGeom prst="rect">
             <a:avLst/>
@@ -13681,8 +12442,8 @@
         </p:blipFill>
         <p:spPr>
           <a:xfrm>
-            <a:off x="549360" y="3911760"/>
-            <a:ext cx="5288760" cy="2872080"/>
+            <a:off x="549000" y="3911760"/>
+            <a:ext cx="5286960" cy="2871720"/>
           </a:xfrm>
           <a:prstGeom prst="rect">
             <a:avLst/>
@@ -13704,8 +12465,8 @@
         </p:blipFill>
         <p:spPr>
           <a:xfrm>
-            <a:off x="6079680" y="3950640"/>
-            <a:ext cx="5777640" cy="2566800"/>
+            <a:off x="6077880" y="3950640"/>
+            <a:ext cx="5775840" cy="2566440"/>
           </a:xfrm>
           <a:prstGeom prst="rect">
             <a:avLst/>
@@ -13757,8 +12518,8 @@
         </p:nvSpPr>
         <p:spPr>
           <a:xfrm>
-            <a:off x="609480" y="273600"/>
-            <a:ext cx="10972080" cy="1144440"/>
+            <a:off x="609120" y="273600"/>
+            <a:ext cx="10968840" cy="1144080"/>
           </a:xfrm>
           <a:prstGeom prst="rect">
             <a:avLst/>
@@ -13774,7 +12535,13 @@
           </a:bodyPr>
           <a:p>
             <a:pPr indent="0" algn="ctr">
+              <a:lnSpc>
+                <a:spcPct val="100000"/>
+              </a:lnSpc>
               <a:buNone/>
+              <a:tabLst>
+                <a:tab algn="l" pos="0"/>
+              </a:tabLst>
             </a:pPr>
             <a:r>
               <a:rPr b="0" lang="en-US" sz="4400" spc="-1" strike="noStrike">
@@ -13783,52 +12550,7 @@
                 </a:solidFill>
                 <a:latin typeface="Arial"/>
               </a:rPr>
-              <a:t>En</a:t>
-            </a:r>
-            <a:r>
-              <a:rPr b="0" lang="en-US" sz="4400" spc="-1" strike="noStrike">
-                <a:solidFill>
-                  <a:srgbClr val="000000"/>
-                </a:solidFill>
-                <a:latin typeface="Arial"/>
-              </a:rPr>
-              <a:t>erg</a:t>
-            </a:r>
-            <a:r>
-              <a:rPr b="0" lang="en-US" sz="4400" spc="-1" strike="noStrike">
-                <a:solidFill>
-                  <a:srgbClr val="000000"/>
-                </a:solidFill>
-                <a:latin typeface="Arial"/>
-              </a:rPr>
-              <a:t>y </a:t>
-            </a:r>
-            <a:r>
-              <a:rPr b="0" lang="en-US" sz="4400" spc="-1" strike="noStrike">
-                <a:solidFill>
-                  <a:srgbClr val="000000"/>
-                </a:solidFill>
-                <a:latin typeface="Arial"/>
-              </a:rPr>
-              <a:t>De</a:t>
-            </a:r>
-            <a:r>
-              <a:rPr b="0" lang="en-US" sz="4400" spc="-1" strike="noStrike">
-                <a:solidFill>
-                  <a:srgbClr val="000000"/>
-                </a:solidFill>
-                <a:latin typeface="Arial"/>
-              </a:rPr>
-              <a:t>ma</a:t>
-            </a:r>
-            <a:r>
-              <a:rPr b="0" lang="en-US" sz="4400" spc="-1" strike="noStrike">
-                <a:solidFill>
-                  <a:srgbClr val="000000"/>
-                </a:solidFill>
-                <a:latin typeface="Arial"/>
-              </a:rPr>
-              <a:t>nd</a:t>
+              <a:t>Energy Demand</a:t>
             </a:r>
             <a:endParaRPr b="0" lang="en-US" sz="4400" spc="-1" strike="noStrike">
               <a:solidFill>
@@ -13851,8 +12573,8 @@
         </p:blipFill>
         <p:spPr>
           <a:xfrm>
-            <a:off x="1582560" y="1619280"/>
-            <a:ext cx="8928000" cy="4306320"/>
+            <a:off x="1581840" y="1619280"/>
+            <a:ext cx="8925120" cy="4305960"/>
           </a:xfrm>
           <a:prstGeom prst="rect">
             <a:avLst/>
@@ -13904,8 +12626,8 @@
         </p:nvSpPr>
         <p:spPr>
           <a:xfrm>
-            <a:off x="609480" y="273240"/>
-            <a:ext cx="10972080" cy="1144440"/>
+            <a:off x="609120" y="273240"/>
+            <a:ext cx="10968840" cy="1144080"/>
           </a:xfrm>
           <a:prstGeom prst="rect">
             <a:avLst/>
@@ -13936,70 +12658,7 @@
                 </a:solidFill>
                 <a:latin typeface="Arial"/>
               </a:rPr>
-              <a:t>Pro</a:t>
-            </a:r>
-            <a:r>
-              <a:rPr b="0" lang="en-US" sz="4400" spc="-1" strike="noStrike">
-                <a:solidFill>
-                  <a:srgbClr val="000000"/>
-                </a:solidFill>
-                <a:latin typeface="Arial"/>
-              </a:rPr>
-              <a:t>ces</a:t>
-            </a:r>
-            <a:r>
-              <a:rPr b="0" lang="en-US" sz="4400" spc="-1" strike="noStrike">
-                <a:solidFill>
-                  <a:srgbClr val="000000"/>
-                </a:solidFill>
-                <a:latin typeface="Arial"/>
-              </a:rPr>
-              <a:t>s </a:t>
-            </a:r>
-            <a:r>
-              <a:rPr b="0" lang="en-US" sz="4400" spc="-1" strike="noStrike">
-                <a:solidFill>
-                  <a:srgbClr val="000000"/>
-                </a:solidFill>
-                <a:latin typeface="Arial"/>
-              </a:rPr>
-              <a:t>for </a:t>
-            </a:r>
-            <a:r>
-              <a:rPr b="0" lang="en-US" sz="4400" spc="-1" strike="noStrike">
-                <a:solidFill>
-                  <a:srgbClr val="000000"/>
-                </a:solidFill>
-                <a:latin typeface="Arial"/>
-              </a:rPr>
-              <a:t>co</a:t>
-            </a:r>
-            <a:r>
-              <a:rPr b="0" lang="en-US" sz="4400" spc="-1" strike="noStrike">
-                <a:solidFill>
-                  <a:srgbClr val="000000"/>
-                </a:solidFill>
-                <a:latin typeface="Arial"/>
-              </a:rPr>
-              <a:t>mp</a:t>
-            </a:r>
-            <a:r>
-              <a:rPr b="0" lang="en-US" sz="4400" spc="-1" strike="noStrike">
-                <a:solidFill>
-                  <a:srgbClr val="000000"/>
-                </a:solidFill>
-                <a:latin typeface="Arial"/>
-              </a:rPr>
-              <a:t>aris</a:t>
-            </a:r>
-            <a:r>
-              <a:rPr b="0" lang="en-US" sz="4400" spc="-1" strike="noStrike">
-                <a:solidFill>
-                  <a:srgbClr val="000000"/>
-                </a:solidFill>
-                <a:latin typeface="Arial"/>
-              </a:rPr>
-              <a:t>on</a:t>
+              <a:t>Process for comparison</a:t>
             </a:r>
             <a:endParaRPr b="0" lang="en-US" sz="4400" spc="-1" strike="noStrike">
               <a:solidFill>
@@ -14022,8 +12681,8 @@
         </p:nvSpPr>
         <p:spPr>
           <a:xfrm>
-            <a:off x="829440" y="1552680"/>
-            <a:ext cx="10972080" cy="3976920"/>
+            <a:off x="829080" y="1552680"/>
+            <a:ext cx="10968840" cy="3976560"/>
           </a:xfrm>
           <a:prstGeom prst="rect">
             <a:avLst/>
@@ -14054,565 +12713,7 @@
                 </a:solidFill>
                 <a:latin typeface="Arial"/>
               </a:rPr>
-              <a:t>We </a:t>
-            </a:r>
-            <a:r>
-              <a:rPr b="0" lang="en-US" sz="3870" spc="-1" strike="noStrike">
-                <a:solidFill>
-                  <a:srgbClr val="000000"/>
-                </a:solidFill>
-                <a:latin typeface="Arial"/>
-              </a:rPr>
-              <a:t>com</a:t>
-            </a:r>
-            <a:r>
-              <a:rPr b="0" lang="en-US" sz="3870" spc="-1" strike="noStrike">
-                <a:solidFill>
-                  <a:srgbClr val="000000"/>
-                </a:solidFill>
-                <a:latin typeface="Arial"/>
-              </a:rPr>
-              <a:t>par</a:t>
-            </a:r>
-            <a:r>
-              <a:rPr b="0" lang="en-US" sz="3870" spc="-1" strike="noStrike">
-                <a:solidFill>
-                  <a:srgbClr val="000000"/>
-                </a:solidFill>
-                <a:latin typeface="Arial"/>
-              </a:rPr>
-              <a:t>ed </a:t>
-            </a:r>
-            <a:r>
-              <a:rPr b="0" lang="en-US" sz="3870" spc="-1" strike="noStrike">
-                <a:solidFill>
-                  <a:srgbClr val="000000"/>
-                </a:solidFill>
-                <a:latin typeface="Arial"/>
-              </a:rPr>
-              <a:t>our </a:t>
-            </a:r>
-            <a:r>
-              <a:rPr b="0" lang="en-US" sz="3870" spc="-1" strike="noStrike">
-                <a:solidFill>
-                  <a:srgbClr val="000000"/>
-                </a:solidFill>
-                <a:latin typeface="Arial"/>
-              </a:rPr>
-              <a:t>proc</a:t>
-            </a:r>
-            <a:r>
-              <a:rPr b="0" lang="en-US" sz="3870" spc="-1" strike="noStrike">
-                <a:solidFill>
-                  <a:srgbClr val="000000"/>
-                </a:solidFill>
-                <a:latin typeface="Arial"/>
-              </a:rPr>
-              <a:t>ess </a:t>
-            </a:r>
-            <a:r>
-              <a:rPr b="0" lang="en-US" sz="3870" spc="-1" strike="noStrike">
-                <a:solidFill>
-                  <a:srgbClr val="000000"/>
-                </a:solidFill>
-                <a:latin typeface="Arial"/>
-              </a:rPr>
-              <a:t>with </a:t>
-            </a:r>
-            <a:r>
-              <a:rPr b="0" lang="en-US" sz="3870" spc="-1" strike="noStrike">
-                <a:solidFill>
-                  <a:srgbClr val="000000"/>
-                </a:solidFill>
-                <a:latin typeface="Arial"/>
-              </a:rPr>
-              <a:t>a </a:t>
-            </a:r>
-            <a:r>
-              <a:rPr b="0" lang="en-US" sz="3870" spc="-1" strike="noStrike">
-                <a:solidFill>
-                  <a:srgbClr val="000000"/>
-                </a:solidFill>
-                <a:latin typeface="Arial"/>
-              </a:rPr>
-              <a:t>con</a:t>
-            </a:r>
-            <a:r>
-              <a:rPr b="0" lang="en-US" sz="3870" spc="-1" strike="noStrike">
-                <a:solidFill>
-                  <a:srgbClr val="000000"/>
-                </a:solidFill>
-                <a:latin typeface="Arial"/>
-              </a:rPr>
-              <a:t>vent</a:t>
-            </a:r>
-            <a:r>
-              <a:rPr b="0" lang="en-US" sz="3870" spc="-1" strike="noStrike">
-                <a:solidFill>
-                  <a:srgbClr val="000000"/>
-                </a:solidFill>
-                <a:latin typeface="Arial"/>
-              </a:rPr>
-              <a:t>iona</a:t>
-            </a:r>
-            <a:r>
-              <a:rPr b="0" lang="en-US" sz="3870" spc="-1" strike="noStrike">
-                <a:solidFill>
-                  <a:srgbClr val="000000"/>
-                </a:solidFill>
-                <a:latin typeface="Arial"/>
-              </a:rPr>
-              <a:t>l </a:t>
-            </a:r>
-            <a:r>
-              <a:rPr b="0" lang="en-US" sz="3870" spc="-1" strike="noStrike">
-                <a:solidFill>
-                  <a:srgbClr val="000000"/>
-                </a:solidFill>
-                <a:latin typeface="Arial"/>
-              </a:rPr>
-              <a:t>cycl</a:t>
-            </a:r>
-            <a:r>
-              <a:rPr b="0" lang="en-US" sz="3870" spc="-1" strike="noStrike">
-                <a:solidFill>
-                  <a:srgbClr val="000000"/>
-                </a:solidFill>
-                <a:latin typeface="Arial"/>
-              </a:rPr>
-              <a:t>ope</a:t>
-            </a:r>
-            <a:r>
-              <a:rPr b="0" lang="en-US" sz="3870" spc="-1" strike="noStrike">
-                <a:solidFill>
-                  <a:srgbClr val="000000"/>
-                </a:solidFill>
-                <a:latin typeface="Arial"/>
-              </a:rPr>
-              <a:t>ntan</a:t>
-            </a:r>
-            <a:r>
-              <a:rPr b="0" lang="en-US" sz="3870" spc="-1" strike="noStrike">
-                <a:solidFill>
-                  <a:srgbClr val="000000"/>
-                </a:solidFill>
-                <a:latin typeface="Arial"/>
-              </a:rPr>
-              <a:t>one </a:t>
-            </a:r>
-            <a:r>
-              <a:rPr b="0" lang="en-US" sz="3870" spc="-1" strike="noStrike">
-                <a:solidFill>
-                  <a:srgbClr val="000000"/>
-                </a:solidFill>
-                <a:latin typeface="Arial"/>
-              </a:rPr>
-              <a:t>pro</a:t>
-            </a:r>
-            <a:r>
-              <a:rPr b="0" lang="en-US" sz="3870" spc="-1" strike="noStrike">
-                <a:solidFill>
-                  <a:srgbClr val="000000"/>
-                </a:solidFill>
-                <a:latin typeface="Arial"/>
-              </a:rPr>
-              <a:t>duct</a:t>
-            </a:r>
-            <a:r>
-              <a:rPr b="0" lang="en-US" sz="3870" spc="-1" strike="noStrike">
-                <a:solidFill>
-                  <a:srgbClr val="000000"/>
-                </a:solidFill>
-                <a:latin typeface="Arial"/>
-              </a:rPr>
-              <a:t>ion </a:t>
-            </a:r>
-            <a:r>
-              <a:rPr b="0" lang="en-US" sz="3870" spc="-1" strike="noStrike">
-                <a:solidFill>
-                  <a:srgbClr val="000000"/>
-                </a:solidFill>
-                <a:latin typeface="Arial"/>
-              </a:rPr>
-              <a:t>proc</a:t>
-            </a:r>
-            <a:r>
-              <a:rPr b="0" lang="en-US" sz="3870" spc="-1" strike="noStrike">
-                <a:solidFill>
-                  <a:srgbClr val="000000"/>
-                </a:solidFill>
-                <a:latin typeface="Arial"/>
-              </a:rPr>
-              <a:t>ess </a:t>
-            </a:r>
-            <a:r>
-              <a:rPr b="0" lang="en-US" sz="3870" spc="-1" strike="noStrike">
-                <a:solidFill>
-                  <a:srgbClr val="000000"/>
-                </a:solidFill>
-                <a:latin typeface="Arial"/>
-              </a:rPr>
-              <a:t>[1], </a:t>
-            </a:r>
-            <a:r>
-              <a:rPr b="0" lang="en-US" sz="3870" spc="-1" strike="noStrike">
-                <a:solidFill>
-                  <a:srgbClr val="000000"/>
-                </a:solidFill>
-                <a:latin typeface="Arial"/>
-              </a:rPr>
-              <a:t>bas</a:t>
-            </a:r>
-            <a:r>
-              <a:rPr b="0" lang="en-US" sz="3870" spc="-1" strike="noStrike">
-                <a:solidFill>
-                  <a:srgbClr val="000000"/>
-                </a:solidFill>
-                <a:latin typeface="Arial"/>
-              </a:rPr>
-              <a:t>ed </a:t>
-            </a:r>
-            <a:r>
-              <a:rPr b="0" lang="en-US" sz="3870" spc="-1" strike="noStrike">
-                <a:solidFill>
-                  <a:srgbClr val="000000"/>
-                </a:solidFill>
-                <a:latin typeface="Arial"/>
-              </a:rPr>
-              <a:t>on </a:t>
-            </a:r>
-            <a:r>
-              <a:rPr b="0" lang="en-US" sz="3870" spc="-1" strike="noStrike">
-                <a:solidFill>
-                  <a:srgbClr val="000000"/>
-                </a:solidFill>
-                <a:latin typeface="Arial"/>
-              </a:rPr>
-              <a:t>petr</a:t>
-            </a:r>
-            <a:r>
-              <a:rPr b="0" lang="en-US" sz="3870" spc="-1" strike="noStrike">
-                <a:solidFill>
-                  <a:srgbClr val="000000"/>
-                </a:solidFill>
-                <a:latin typeface="Arial"/>
-              </a:rPr>
-              <a:t>elai</a:t>
-            </a:r>
-            <a:r>
-              <a:rPr b="0" lang="en-US" sz="3870" spc="-1" strike="noStrike">
-                <a:solidFill>
-                  <a:srgbClr val="000000"/>
-                </a:solidFill>
-                <a:latin typeface="Arial"/>
-              </a:rPr>
-              <a:t>c </a:t>
-            </a:r>
-            <a:r>
-              <a:rPr b="0" lang="en-US" sz="3870" spc="-1" strike="noStrike">
-                <a:solidFill>
-                  <a:srgbClr val="000000"/>
-                </a:solidFill>
-                <a:latin typeface="Arial"/>
-              </a:rPr>
-              <a:t>feed</a:t>
-            </a:r>
-            <a:r>
-              <a:rPr b="0" lang="en-US" sz="3870" spc="-1" strike="noStrike">
-                <a:solidFill>
-                  <a:srgbClr val="000000"/>
-                </a:solidFill>
-                <a:latin typeface="Arial"/>
-              </a:rPr>
-              <a:t>stoc</a:t>
-            </a:r>
-            <a:r>
-              <a:rPr b="0" lang="en-US" sz="3870" spc="-1" strike="noStrike">
-                <a:solidFill>
-                  <a:srgbClr val="000000"/>
-                </a:solidFill>
-                <a:latin typeface="Arial"/>
-              </a:rPr>
-              <a:t>k </a:t>
-            </a:r>
-            <a:r>
-              <a:rPr b="0" lang="en-US" sz="3870" spc="-1" strike="noStrike">
-                <a:solidFill>
-                  <a:srgbClr val="000000"/>
-                </a:solidFill>
-                <a:latin typeface="Arial"/>
-              </a:rPr>
-              <a:t>and </a:t>
-            </a:r>
-            <a:r>
-              <a:rPr b="0" lang="en-US" sz="3870" spc="-1" strike="noStrike">
-                <a:solidFill>
-                  <a:srgbClr val="000000"/>
-                </a:solidFill>
-                <a:latin typeface="Arial"/>
-              </a:rPr>
-              <a:t>mor</a:t>
-            </a:r>
-            <a:r>
-              <a:rPr b="0" lang="en-US" sz="3870" spc="-1" strike="noStrike">
-                <a:solidFill>
-                  <a:srgbClr val="000000"/>
-                </a:solidFill>
-                <a:latin typeface="Arial"/>
-              </a:rPr>
-              <a:t>e </a:t>
-            </a:r>
-            <a:r>
-              <a:rPr b="0" lang="en-US" sz="3870" spc="-1" strike="noStrike">
-                <a:solidFill>
-                  <a:srgbClr val="000000"/>
-                </a:solidFill>
-                <a:latin typeface="Arial"/>
-              </a:rPr>
-              <a:t>spe</a:t>
-            </a:r>
-            <a:r>
-              <a:rPr b="0" lang="en-US" sz="3870" spc="-1" strike="noStrike">
-                <a:solidFill>
-                  <a:srgbClr val="000000"/>
-                </a:solidFill>
-                <a:latin typeface="Arial"/>
-              </a:rPr>
-              <a:t>cific</a:t>
-            </a:r>
-            <a:r>
-              <a:rPr b="0" lang="en-US" sz="3870" spc="-1" strike="noStrike">
-                <a:solidFill>
-                  <a:srgbClr val="000000"/>
-                </a:solidFill>
-                <a:latin typeface="Arial"/>
-              </a:rPr>
-              <a:t>ally </a:t>
-            </a:r>
-            <a:r>
-              <a:rPr b="0" lang="en-US" sz="3870" spc="-1" strike="noStrike">
-                <a:solidFill>
-                  <a:srgbClr val="000000"/>
-                </a:solidFill>
-                <a:latin typeface="Arial"/>
-              </a:rPr>
-              <a:t>on </a:t>
-            </a:r>
-            <a:r>
-              <a:rPr b="0" lang="en-US" sz="3870" spc="-1" strike="noStrike">
-                <a:solidFill>
-                  <a:srgbClr val="000000"/>
-                </a:solidFill>
-                <a:latin typeface="Arial"/>
-              </a:rPr>
-              <a:t>the </a:t>
-            </a:r>
-            <a:r>
-              <a:rPr b="0" lang="en-US" sz="3870" spc="-1" strike="noStrike">
-                <a:solidFill>
-                  <a:srgbClr val="000000"/>
-                </a:solidFill>
-                <a:latin typeface="Arial"/>
-              </a:rPr>
-              <a:t>con</a:t>
-            </a:r>
-            <a:r>
-              <a:rPr b="0" lang="en-US" sz="3870" spc="-1" strike="noStrike">
-                <a:solidFill>
-                  <a:srgbClr val="000000"/>
-                </a:solidFill>
-                <a:latin typeface="Arial"/>
-              </a:rPr>
-              <a:t>vers</a:t>
-            </a:r>
-            <a:r>
-              <a:rPr b="0" lang="en-US" sz="3870" spc="-1" strike="noStrike">
-                <a:solidFill>
-                  <a:srgbClr val="000000"/>
-                </a:solidFill>
-                <a:latin typeface="Arial"/>
-              </a:rPr>
-              <a:t>ion </a:t>
-            </a:r>
-            <a:r>
-              <a:rPr b="0" lang="en-US" sz="3870" spc="-1" strike="noStrike">
-                <a:solidFill>
-                  <a:srgbClr val="000000"/>
-                </a:solidFill>
-                <a:latin typeface="Arial"/>
-              </a:rPr>
-              <a:t>of </a:t>
-            </a:r>
-            <a:r>
-              <a:rPr b="0" lang="en-US" sz="3870" spc="-1" strike="noStrike">
-                <a:solidFill>
-                  <a:srgbClr val="000000"/>
-                </a:solidFill>
-                <a:latin typeface="Arial"/>
-              </a:rPr>
-              <a:t>adip</a:t>
-            </a:r>
-            <a:r>
-              <a:rPr b="0" lang="en-US" sz="3870" spc="-1" strike="noStrike">
-                <a:solidFill>
-                  <a:srgbClr val="000000"/>
-                </a:solidFill>
-                <a:latin typeface="Arial"/>
-              </a:rPr>
-              <a:t>ic </a:t>
-            </a:r>
-            <a:r>
-              <a:rPr b="0" lang="en-US" sz="3870" spc="-1" strike="noStrike">
-                <a:solidFill>
-                  <a:srgbClr val="000000"/>
-                </a:solidFill>
-                <a:latin typeface="Arial"/>
-              </a:rPr>
-              <a:t>acid </a:t>
-            </a:r>
-            <a:r>
-              <a:rPr b="0" lang="en-US" sz="3870" spc="-1" strike="noStrike">
-                <a:solidFill>
-                  <a:srgbClr val="000000"/>
-                </a:solidFill>
-                <a:latin typeface="Arial"/>
-              </a:rPr>
-              <a:t>to </a:t>
-            </a:r>
-            <a:r>
-              <a:rPr b="0" lang="en-US" sz="3870" spc="-1" strike="noStrike">
-                <a:solidFill>
-                  <a:srgbClr val="000000"/>
-                </a:solidFill>
-                <a:latin typeface="Arial"/>
-              </a:rPr>
-              <a:t>cycl</a:t>
-            </a:r>
-            <a:r>
-              <a:rPr b="0" lang="en-US" sz="3870" spc="-1" strike="noStrike">
-                <a:solidFill>
-                  <a:srgbClr val="000000"/>
-                </a:solidFill>
-                <a:latin typeface="Arial"/>
-              </a:rPr>
-              <a:t>ope</a:t>
-            </a:r>
-            <a:r>
-              <a:rPr b="0" lang="en-US" sz="3870" spc="-1" strike="noStrike">
-                <a:solidFill>
-                  <a:srgbClr val="000000"/>
-                </a:solidFill>
-                <a:latin typeface="Arial"/>
-              </a:rPr>
-              <a:t>ntan</a:t>
-            </a:r>
-            <a:r>
-              <a:rPr b="0" lang="en-US" sz="3870" spc="-1" strike="noStrike">
-                <a:solidFill>
-                  <a:srgbClr val="000000"/>
-                </a:solidFill>
-                <a:latin typeface="Arial"/>
-              </a:rPr>
-              <a:t>one </a:t>
-            </a:r>
-            <a:r>
-              <a:rPr b="0" lang="en-US" sz="3870" spc="-1" strike="noStrike">
-                <a:solidFill>
-                  <a:srgbClr val="000000"/>
-                </a:solidFill>
-                <a:latin typeface="Arial"/>
-              </a:rPr>
-              <a:t>whe</a:t>
-            </a:r>
-            <a:r>
-              <a:rPr b="0" lang="en-US" sz="3870" spc="-1" strike="noStrike">
-                <a:solidFill>
-                  <a:srgbClr val="000000"/>
-                </a:solidFill>
-                <a:latin typeface="Arial"/>
-              </a:rPr>
-              <a:t>n </a:t>
-            </a:r>
-            <a:r>
-              <a:rPr b="0" lang="en-US" sz="3870" spc="-1" strike="noStrike">
-                <a:solidFill>
-                  <a:srgbClr val="000000"/>
-                </a:solidFill>
-                <a:latin typeface="Arial"/>
-              </a:rPr>
-              <a:t>heat</a:t>
-            </a:r>
-            <a:r>
-              <a:rPr b="0" lang="en-US" sz="3870" spc="-1" strike="noStrike">
-                <a:solidFill>
-                  <a:srgbClr val="000000"/>
-                </a:solidFill>
-                <a:latin typeface="Arial"/>
-              </a:rPr>
-              <a:t>ed </a:t>
-            </a:r>
-            <a:r>
-              <a:rPr b="0" lang="en-US" sz="3870" spc="-1" strike="noStrike">
-                <a:solidFill>
-                  <a:srgbClr val="000000"/>
-                </a:solidFill>
-                <a:latin typeface="Arial"/>
-              </a:rPr>
-              <a:t>with </a:t>
-            </a:r>
-            <a:r>
-              <a:rPr b="0" lang="en-US" sz="3870" spc="-1" strike="noStrike">
-                <a:solidFill>
-                  <a:srgbClr val="000000"/>
-                </a:solidFill>
-                <a:latin typeface="Arial"/>
-              </a:rPr>
-              <a:t>Ba(</a:t>
-            </a:r>
-            <a:r>
-              <a:rPr b="0" lang="en-US" sz="3870" spc="-1" strike="noStrike">
-                <a:solidFill>
-                  <a:srgbClr val="000000"/>
-                </a:solidFill>
-                <a:latin typeface="Arial"/>
-              </a:rPr>
-              <a:t>OH)</a:t>
-            </a:r>
-            <a:r>
-              <a:rPr b="0" lang="en-US" sz="3870" spc="-1" strike="noStrike">
-                <a:solidFill>
-                  <a:srgbClr val="000000"/>
-                </a:solidFill>
-                <a:latin typeface="Arial"/>
-              </a:rPr>
-              <a:t>2 in </a:t>
-            </a:r>
-            <a:r>
-              <a:rPr b="0" lang="en-US" sz="3870" spc="-1" strike="noStrike">
-                <a:solidFill>
-                  <a:srgbClr val="000000"/>
-                </a:solidFill>
-                <a:latin typeface="Arial"/>
-              </a:rPr>
-              <a:t>the </a:t>
-            </a:r>
-            <a:r>
-              <a:rPr b="0" lang="en-US" sz="3870" spc="-1" strike="noStrike">
-                <a:solidFill>
-                  <a:srgbClr val="000000"/>
-                </a:solidFill>
-                <a:latin typeface="Arial"/>
-              </a:rPr>
-              <a:t>mixt</a:t>
-            </a:r>
-            <a:r>
-              <a:rPr b="0" lang="en-US" sz="3870" spc="-1" strike="noStrike">
-                <a:solidFill>
-                  <a:srgbClr val="000000"/>
-                </a:solidFill>
-                <a:latin typeface="Arial"/>
-              </a:rPr>
-              <a:t>ure. </a:t>
+              <a:t>We compared our process with a conventional cyclopentanone production process [1], based on petrelaic feedstock and more specifically on the conversion of adipic acid to cyclopentanone when heated with Ba(OH)2 in the mixture. </a:t>
             </a:r>
             <a:endParaRPr b="0" lang="en-US" sz="3870" spc="-1" strike="noStrike">
               <a:solidFill>

</xml_diff>